<commit_message>
Final upload Week 6
</commit_message>
<xml_diff>
--- a/Todd_Garner_DS6306_Week6_FLS_Part1.pptx
+++ b/Todd_Garner_DS6306_Week6_FLS_Part1.pptx
@@ -1,11 +1,26 @@
 
 <file path=ppt/presentation.xml><?xml version="1.0" encoding="utf-8"?>
-<p:presentation xmlns:a="http://schemas.openxmlformats.org/drawingml/2006/main" xmlns:p="http://schemas.openxmlformats.org/presentationml/2006/main" xmlns:r="http://schemas.openxmlformats.org/officeDocument/2006/relationships" autoCompressPictures="0" saveSubsetFonts="1">
+<p:presentation xmlns:a="http://schemas.openxmlformats.org/drawingml/2006/main" xmlns:r="http://schemas.openxmlformats.org/officeDocument/2006/relationships" xmlns:p="http://schemas.openxmlformats.org/presentationml/2006/main" saveSubsetFonts="1" autoCompressPictures="0">
   <p:sldMasterIdLst>
     <p:sldMasterId id="2147483648" r:id="rId1"/>
   </p:sldMasterIdLst>
   <p:sldIdLst>
     <p:sldId id="256" r:id="rId2"/>
+    <p:sldId id="257" r:id="rId3"/>
+    <p:sldId id="266" r:id="rId4"/>
+    <p:sldId id="258" r:id="rId5"/>
+    <p:sldId id="260" r:id="rId6"/>
+    <p:sldId id="261" r:id="rId7"/>
+    <p:sldId id="262" r:id="rId8"/>
+    <p:sldId id="263" r:id="rId9"/>
+    <p:sldId id="264" r:id="rId10"/>
+    <p:sldId id="265" r:id="rId11"/>
+    <p:sldId id="267" r:id="rId12"/>
+    <p:sldId id="268" r:id="rId13"/>
+    <p:sldId id="269" r:id="rId14"/>
+    <p:sldId id="270" r:id="rId15"/>
+    <p:sldId id="271" r:id="rId16"/>
+    <p:sldId id="272" r:id="rId17"/>
   </p:sldIdLst>
   <p:sldSz cx="9144000" cy="5143500" type="screen16x9"/>
   <p:notesSz cx="6858000" cy="9144000"/>
@@ -13,8 +28,8 @@
     <a:defPPr>
       <a:defRPr lang="en-US"/>
     </a:defPPr>
-    <a:lvl1pPr algn="l" defTabSz="457200" eaLnBrk="1" hangingPunct="1" latinLnBrk="0" marL="0" rtl="0">
-      <a:defRPr kern="1200" sz="1800">
+    <a:lvl1pPr marL="0" algn="l" defTabSz="457200" rtl="0" eaLnBrk="1" latinLnBrk="0" hangingPunct="1">
+      <a:defRPr sz="1800" kern="1200">
         <a:solidFill>
           <a:schemeClr val="tx1"/>
         </a:solidFill>
@@ -23,8 +38,8 @@
         <a:cs typeface="+mn-cs"/>
       </a:defRPr>
     </a:lvl1pPr>
-    <a:lvl2pPr algn="l" defTabSz="457200" eaLnBrk="1" hangingPunct="1" latinLnBrk="0" marL="457200" rtl="0">
-      <a:defRPr kern="1200" sz="1800">
+    <a:lvl2pPr marL="457200" algn="l" defTabSz="457200" rtl="0" eaLnBrk="1" latinLnBrk="0" hangingPunct="1">
+      <a:defRPr sz="1800" kern="1200">
         <a:solidFill>
           <a:schemeClr val="tx1"/>
         </a:solidFill>
@@ -33,8 +48,8 @@
         <a:cs typeface="+mn-cs"/>
       </a:defRPr>
     </a:lvl2pPr>
-    <a:lvl3pPr algn="l" defTabSz="457200" eaLnBrk="1" hangingPunct="1" latinLnBrk="0" marL="914400" rtl="0">
-      <a:defRPr kern="1200" sz="1800">
+    <a:lvl3pPr marL="914400" algn="l" defTabSz="457200" rtl="0" eaLnBrk="1" latinLnBrk="0" hangingPunct="1">
+      <a:defRPr sz="1800" kern="1200">
         <a:solidFill>
           <a:schemeClr val="tx1"/>
         </a:solidFill>
@@ -43,8 +58,8 @@
         <a:cs typeface="+mn-cs"/>
       </a:defRPr>
     </a:lvl3pPr>
-    <a:lvl4pPr algn="l" defTabSz="457200" eaLnBrk="1" hangingPunct="1" latinLnBrk="0" marL="1371600" rtl="0">
-      <a:defRPr kern="1200" sz="1800">
+    <a:lvl4pPr marL="1371600" algn="l" defTabSz="457200" rtl="0" eaLnBrk="1" latinLnBrk="0" hangingPunct="1">
+      <a:defRPr sz="1800" kern="1200">
         <a:solidFill>
           <a:schemeClr val="tx1"/>
         </a:solidFill>
@@ -53,8 +68,8 @@
         <a:cs typeface="+mn-cs"/>
       </a:defRPr>
     </a:lvl4pPr>
-    <a:lvl5pPr algn="l" defTabSz="457200" eaLnBrk="1" hangingPunct="1" latinLnBrk="0" marL="1828800" rtl="0">
-      <a:defRPr kern="1200" sz="1800">
+    <a:lvl5pPr marL="1828800" algn="l" defTabSz="457200" rtl="0" eaLnBrk="1" latinLnBrk="0" hangingPunct="1">
+      <a:defRPr sz="1800" kern="1200">
         <a:solidFill>
           <a:schemeClr val="tx1"/>
         </a:solidFill>
@@ -63,8 +78,8 @@
         <a:cs typeface="+mn-cs"/>
       </a:defRPr>
     </a:lvl5pPr>
-    <a:lvl6pPr algn="l" defTabSz="457200" eaLnBrk="1" hangingPunct="1" latinLnBrk="0" marL="2286000" rtl="0">
-      <a:defRPr kern="1200" sz="1800">
+    <a:lvl6pPr marL="2286000" algn="l" defTabSz="457200" rtl="0" eaLnBrk="1" latinLnBrk="0" hangingPunct="1">
+      <a:defRPr sz="1800" kern="1200">
         <a:solidFill>
           <a:schemeClr val="tx1"/>
         </a:solidFill>
@@ -73,8 +88,8 @@
         <a:cs typeface="+mn-cs"/>
       </a:defRPr>
     </a:lvl6pPr>
-    <a:lvl7pPr algn="l" defTabSz="457200" eaLnBrk="1" hangingPunct="1" latinLnBrk="0" marL="2743200" rtl="0">
-      <a:defRPr kern="1200" sz="1800">
+    <a:lvl7pPr marL="2743200" algn="l" defTabSz="457200" rtl="0" eaLnBrk="1" latinLnBrk="0" hangingPunct="1">
+      <a:defRPr sz="1800" kern="1200">
         <a:solidFill>
           <a:schemeClr val="tx1"/>
         </a:solidFill>
@@ -83,8 +98,8 @@
         <a:cs typeface="+mn-cs"/>
       </a:defRPr>
     </a:lvl7pPr>
-    <a:lvl8pPr algn="l" defTabSz="457200" eaLnBrk="1" hangingPunct="1" latinLnBrk="0" marL="3200400" rtl="0">
-      <a:defRPr kern="1200" sz="1800">
+    <a:lvl8pPr marL="3200400" algn="l" defTabSz="457200" rtl="0" eaLnBrk="1" latinLnBrk="0" hangingPunct="1">
+      <a:defRPr sz="1800" kern="1200">
         <a:solidFill>
           <a:schemeClr val="tx1"/>
         </a:solidFill>
@@ -93,8 +108,8 @@
         <a:cs typeface="+mn-cs"/>
       </a:defRPr>
     </a:lvl8pPr>
-    <a:lvl9pPr algn="l" defTabSz="457200" eaLnBrk="1" hangingPunct="1" latinLnBrk="0" marL="3657600" rtl="0">
-      <a:defRPr kern="1200" sz="1800">
+    <a:lvl9pPr marL="3657600" algn="l" defTabSz="457200" rtl="0" eaLnBrk="1" latinLnBrk="0" hangingPunct="1">
+      <a:defRPr sz="1800" kern="1200">
         <a:solidFill>
           <a:schemeClr val="tx1"/>
         </a:solidFill>
@@ -302,7 +317,7 @@
           <a:p>
             <a:fld id="{241EB5C9-1307-BA42-ABA2-0BC069CD8E7F}" type="datetimeFigureOut">
               <a:rPr lang="en-US" smtClean="0"/>
-              <a:t>1/2/22</a:t>
+              <a:t>2/7/2023</a:t>
             </a:fld>
             <a:endParaRPr lang="en-US"/>
           </a:p>
@@ -470,7 +485,7 @@
           <a:p>
             <a:fld id="{241EB5C9-1307-BA42-ABA2-0BC069CD8E7F}" type="datetimeFigureOut">
               <a:rPr lang="en-US" smtClean="0"/>
-              <a:t>1/2/22</a:t>
+              <a:t>2/7/2023</a:t>
             </a:fld>
             <a:endParaRPr lang="en-US"/>
           </a:p>
@@ -648,7 +663,7 @@
           <a:p>
             <a:fld id="{241EB5C9-1307-BA42-ABA2-0BC069CD8E7F}" type="datetimeFigureOut">
               <a:rPr lang="en-US" smtClean="0"/>
-              <a:t>1/2/22</a:t>
+              <a:t>2/7/2023</a:t>
             </a:fld>
             <a:endParaRPr lang="en-US"/>
           </a:p>
@@ -816,7 +831,7 @@
           <a:p>
             <a:fld id="{241EB5C9-1307-BA42-ABA2-0BC069CD8E7F}" type="datetimeFigureOut">
               <a:rPr lang="en-US" smtClean="0"/>
-              <a:t>1/2/22</a:t>
+              <a:t>2/7/2023</a:t>
             </a:fld>
             <a:endParaRPr lang="en-US"/>
           </a:p>
@@ -1061,7 +1076,7 @@
           <a:p>
             <a:fld id="{241EB5C9-1307-BA42-ABA2-0BC069CD8E7F}" type="datetimeFigureOut">
               <a:rPr lang="en-US" smtClean="0"/>
-              <a:t>1/2/22</a:t>
+              <a:t>2/7/2023</a:t>
             </a:fld>
             <a:endParaRPr lang="en-US"/>
           </a:p>
@@ -1346,7 +1361,7 @@
           <a:p>
             <a:fld id="{241EB5C9-1307-BA42-ABA2-0BC069CD8E7F}" type="datetimeFigureOut">
               <a:rPr lang="en-US" smtClean="0"/>
-              <a:t>1/2/22</a:t>
+              <a:t>2/7/2023</a:t>
             </a:fld>
             <a:endParaRPr lang="en-US"/>
           </a:p>
@@ -1765,7 +1780,7 @@
           <a:p>
             <a:fld id="{241EB5C9-1307-BA42-ABA2-0BC069CD8E7F}" type="datetimeFigureOut">
               <a:rPr lang="en-US" smtClean="0"/>
-              <a:t>1/2/22</a:t>
+              <a:t>2/7/2023</a:t>
             </a:fld>
             <a:endParaRPr lang="en-US"/>
           </a:p>
@@ -1882,7 +1897,7 @@
           <a:p>
             <a:fld id="{241EB5C9-1307-BA42-ABA2-0BC069CD8E7F}" type="datetimeFigureOut">
               <a:rPr lang="en-US" smtClean="0"/>
-              <a:t>1/2/22</a:t>
+              <a:t>2/7/2023</a:t>
             </a:fld>
             <a:endParaRPr lang="en-US"/>
           </a:p>
@@ -1977,7 +1992,7 @@
           <a:p>
             <a:fld id="{241EB5C9-1307-BA42-ABA2-0BC069CD8E7F}" type="datetimeFigureOut">
               <a:rPr lang="en-US" smtClean="0"/>
-              <a:t>1/2/22</a:t>
+              <a:t>2/7/2023</a:t>
             </a:fld>
             <a:endParaRPr lang="en-US"/>
           </a:p>
@@ -2252,7 +2267,7 @@
           <a:p>
             <a:fld id="{241EB5C9-1307-BA42-ABA2-0BC069CD8E7F}" type="datetimeFigureOut">
               <a:rPr lang="en-US" smtClean="0"/>
-              <a:t>1/2/22</a:t>
+              <a:t>2/7/2023</a:t>
             </a:fld>
             <a:endParaRPr lang="en-US"/>
           </a:p>
@@ -2504,7 +2519,7 @@
           <a:p>
             <a:fld id="{241EB5C9-1307-BA42-ABA2-0BC069CD8E7F}" type="datetimeFigureOut">
               <a:rPr lang="en-US" smtClean="0"/>
-              <a:t>1/2/22</a:t>
+              <a:t>2/7/2023</a:t>
             </a:fld>
             <a:endParaRPr lang="en-US"/>
           </a:p>
@@ -2566,7 +2581,7 @@
 </file>
 
 <file path=ppt/slideMasters/slideMaster1.xml><?xml version="1.0" encoding="utf-8"?>
-<p:sldMaster xmlns:a="http://schemas.openxmlformats.org/drawingml/2006/main" xmlns:p="http://schemas.openxmlformats.org/presentationml/2006/main" xmlns:r="http://schemas.openxmlformats.org/officeDocument/2006/relationships">
+<p:sldMaster xmlns:a="http://schemas.openxmlformats.org/drawingml/2006/main" xmlns:r="http://schemas.openxmlformats.org/officeDocument/2006/relationships" xmlns:p="http://schemas.openxmlformats.org/presentationml/2006/main">
   <p:cSld>
     <p:bg>
       <p:bgRef idx="1001">
@@ -2607,7 +2622,7 @@
           </a:prstGeom>
         </p:spPr>
         <p:txBody>
-          <a:bodyPr anchor="ctr" bIns="45720" lIns="91440" rIns="91440" rtlCol="0" tIns="45720" vert="horz">
+          <a:bodyPr vert="horz" lIns="91440" tIns="45720" rIns="91440" bIns="45720" rtlCol="0" anchor="ctr">
             <a:normAutofit/>
           </a:bodyPr>
           <a:lstStyle/>
@@ -2626,7 +2641,7 @@
             <a:spLocks noGrp="1"/>
           </p:cNvSpPr>
           <p:nvPr>
-            <p:ph idx="1" type="body"/>
+            <p:ph type="body" idx="1"/>
           </p:nvPr>
         </p:nvSpPr>
         <p:spPr>
@@ -2639,7 +2654,7 @@
           </a:prstGeom>
         </p:spPr>
         <p:txBody>
-          <a:bodyPr bIns="45720" lIns="91440" rIns="91440" rtlCol="0" tIns="45720" vert="horz">
+          <a:bodyPr vert="horz" lIns="91440" tIns="45720" rIns="91440" bIns="45720" rtlCol="0">
             <a:normAutofit/>
           </a:bodyPr>
           <a:lstStyle/>
@@ -2687,7 +2702,7 @@
             <a:spLocks noGrp="1"/>
           </p:cNvSpPr>
           <p:nvPr>
-            <p:ph idx="2" sz="half" type="dt"/>
+            <p:ph type="dt" sz="half" idx="2"/>
           </p:nvPr>
         </p:nvSpPr>
         <p:spPr>
@@ -2700,7 +2715,7 @@
           </a:prstGeom>
         </p:spPr>
         <p:txBody>
-          <a:bodyPr anchor="ctr" bIns="45720" lIns="91440" rIns="91440" rtlCol="0" tIns="45720" vert="horz"/>
+          <a:bodyPr vert="horz" lIns="91440" tIns="45720" rIns="91440" bIns="45720" rtlCol="0" anchor="ctr"/>
           <a:lstStyle>
             <a:lvl1pPr algn="l">
               <a:defRPr sz="900">
@@ -2715,7 +2730,7 @@
           <a:p>
             <a:fld id="{241EB5C9-1307-BA42-ABA2-0BC069CD8E7F}" type="datetimeFigureOut">
               <a:rPr lang="en-US" smtClean="0"/>
-              <a:t>1/2/22</a:t>
+              <a:t>2/7/2023</a:t>
             </a:fld>
             <a:endParaRPr lang="en-US"/>
           </a:p>
@@ -2728,7 +2743,7 @@
             <a:spLocks noGrp="1"/>
           </p:cNvSpPr>
           <p:nvPr>
-            <p:ph idx="3" sz="quarter" type="ftr"/>
+            <p:ph type="ftr" sz="quarter" idx="3"/>
           </p:nvPr>
         </p:nvSpPr>
         <p:spPr>
@@ -2741,7 +2756,7 @@
           </a:prstGeom>
         </p:spPr>
         <p:txBody>
-          <a:bodyPr anchor="ctr" bIns="45720" lIns="91440" rIns="91440" rtlCol="0" tIns="45720" vert="horz"/>
+          <a:bodyPr vert="horz" lIns="91440" tIns="45720" rIns="91440" bIns="45720" rtlCol="0" anchor="ctr"/>
           <a:lstStyle>
             <a:lvl1pPr algn="ctr">
               <a:defRPr sz="900">
@@ -2765,7 +2780,7 @@
             <a:spLocks noGrp="1"/>
           </p:cNvSpPr>
           <p:nvPr>
-            <p:ph idx="4" sz="quarter" type="sldNum"/>
+            <p:ph type="sldNum" sz="quarter" idx="4"/>
           </p:nvPr>
         </p:nvSpPr>
         <p:spPr>
@@ -2778,7 +2793,7 @@
           </a:prstGeom>
         </p:spPr>
         <p:txBody>
-          <a:bodyPr anchor="ctr" bIns="45720" lIns="91440" rIns="91440" rtlCol="0" tIns="45720" vert="horz"/>
+          <a:bodyPr vert="horz" lIns="91440" tIns="45720" rIns="91440" bIns="45720" rtlCol="0" anchor="ctr"/>
           <a:lstStyle>
             <a:lvl1pPr algn="r">
               <a:defRPr sz="900">
@@ -2806,7 +2821,7 @@
       </p:ext>
     </p:extLst>
   </p:cSld>
-  <p:clrMap accent1="accent1" accent2="accent2" accent3="accent3" accent4="accent4" accent5="accent5" accent6="accent6" bg1="lt1" bg2="lt2" folHlink="folHlink" hlink="hlink" tx1="dk1" tx2="dk2"/>
+  <p:clrMap bg1="lt1" tx1="dk1" bg2="lt2" tx2="dk2" accent1="accent1" accent2="accent2" accent3="accent3" accent4="accent4" accent5="accent5" accent6="accent6" hlink="hlink" folHlink="folHlink"/>
   <p:sldLayoutIdLst>
     <p:sldLayoutId id="2147483649" r:id="rId1"/>
     <p:sldLayoutId id="2147483650" r:id="rId2"/>
@@ -2822,12 +2837,12 @@
   </p:sldLayoutIdLst>
   <p:txStyles>
     <p:titleStyle>
-      <a:lvl1pPr algn="ctr" defTabSz="342900" eaLnBrk="1" hangingPunct="1" latinLnBrk="0" rtl="0">
+      <a:lvl1pPr algn="ctr" defTabSz="342900" rtl="0" eaLnBrk="1" latinLnBrk="0" hangingPunct="1">
         <a:spcBef>
           <a:spcPct val="0"/>
         </a:spcBef>
         <a:buNone/>
-        <a:defRPr kern="1200" sz="3300">
+        <a:defRPr sz="3300" kern="1200">
           <a:solidFill>
             <a:schemeClr val="tx1"/>
           </a:solidFill>
@@ -2838,13 +2853,13 @@
       </a:lvl1pPr>
     </p:titleStyle>
     <p:bodyStyle>
-      <a:lvl1pPr algn="l" defTabSz="342900" eaLnBrk="1" hangingPunct="1" indent="-342900" latinLnBrk="0" marL="342900" rtl="0">
+      <a:lvl1pPr marL="342900" indent="-342900" algn="l" defTabSz="342900" rtl="0" eaLnBrk="1" latinLnBrk="0" hangingPunct="1">
         <a:spcBef>
           <a:spcPct val="20000"/>
         </a:spcBef>
         <a:buFont typeface="Arial"/>
         <a:buChar char="•"/>
-        <a:defRPr kern="1200" sz="2400">
+        <a:defRPr sz="2400" kern="1200">
           <a:solidFill>
             <a:schemeClr val="tx1"/>
           </a:solidFill>
@@ -2853,13 +2868,13 @@
           <a:cs typeface="+mn-cs"/>
         </a:defRPr>
       </a:lvl1pPr>
-      <a:lvl2pPr algn="l" defTabSz="342900" eaLnBrk="1" hangingPunct="1" indent="-342900" latinLnBrk="0" marL="685800" rtl="0">
+      <a:lvl2pPr marL="685800" indent="-342900" algn="l" defTabSz="342900" rtl="0" eaLnBrk="1" latinLnBrk="0" hangingPunct="1">
         <a:spcBef>
           <a:spcPct val="20000"/>
         </a:spcBef>
         <a:buFont typeface="Arial"/>
         <a:buChar char="–"/>
-        <a:defRPr kern="1200" sz="2100">
+        <a:defRPr sz="2100" kern="1200">
           <a:solidFill>
             <a:schemeClr val="tx1"/>
           </a:solidFill>
@@ -2868,13 +2883,13 @@
           <a:cs typeface="+mn-cs"/>
         </a:defRPr>
       </a:lvl2pPr>
-      <a:lvl3pPr algn="l" defTabSz="342900" eaLnBrk="1" hangingPunct="1" indent="-342900" latinLnBrk="0" marL="1028700" rtl="0">
+      <a:lvl3pPr marL="1028700" indent="-342900" algn="l" defTabSz="342900" rtl="0" eaLnBrk="1" latinLnBrk="0" hangingPunct="1">
         <a:spcBef>
           <a:spcPct val="20000"/>
         </a:spcBef>
         <a:buFont typeface="Arial"/>
         <a:buChar char="•"/>
-        <a:defRPr kern="1200" sz="1800">
+        <a:defRPr sz="1800" kern="1200">
           <a:solidFill>
             <a:schemeClr val="tx1"/>
           </a:solidFill>
@@ -2883,13 +2898,13 @@
           <a:cs typeface="+mn-cs"/>
         </a:defRPr>
       </a:lvl3pPr>
-      <a:lvl4pPr algn="l" defTabSz="342900" eaLnBrk="1" hangingPunct="1" indent="-342900" latinLnBrk="0" marL="1371600" rtl="0">
+      <a:lvl4pPr marL="1371600" indent="-342900" algn="l" defTabSz="342900" rtl="0" eaLnBrk="1" latinLnBrk="0" hangingPunct="1">
         <a:spcBef>
           <a:spcPct val="20000"/>
         </a:spcBef>
         <a:buFont typeface="Arial"/>
         <a:buChar char="–"/>
-        <a:defRPr kern="1200" sz="1500">
+        <a:defRPr sz="1500" kern="1200">
           <a:solidFill>
             <a:schemeClr val="tx1"/>
           </a:solidFill>
@@ -2898,13 +2913,13 @@
           <a:cs typeface="+mn-cs"/>
         </a:defRPr>
       </a:lvl4pPr>
-      <a:lvl5pPr algn="l" defTabSz="342900" eaLnBrk="1" hangingPunct="1" indent="-342900" latinLnBrk="0" marL="1714500" rtl="0">
+      <a:lvl5pPr marL="1714500" indent="-342900" algn="l" defTabSz="342900" rtl="0" eaLnBrk="1" latinLnBrk="0" hangingPunct="1">
         <a:spcBef>
           <a:spcPct val="20000"/>
         </a:spcBef>
         <a:buFont typeface="Arial"/>
         <a:buChar char="»"/>
-        <a:defRPr kern="1200" sz="1500">
+        <a:defRPr sz="1500" kern="1200">
           <a:solidFill>
             <a:schemeClr val="tx1"/>
           </a:solidFill>
@@ -2913,13 +2928,13 @@
           <a:cs typeface="+mn-cs"/>
         </a:defRPr>
       </a:lvl5pPr>
-      <a:lvl6pPr algn="l" defTabSz="342900" eaLnBrk="1" hangingPunct="1" indent="-342900" latinLnBrk="0" marL="2057400" rtl="0">
+      <a:lvl6pPr marL="2057400" indent="-342900" algn="l" defTabSz="342900" rtl="0" eaLnBrk="1" latinLnBrk="0" hangingPunct="1">
         <a:spcBef>
           <a:spcPct val="20000"/>
         </a:spcBef>
         <a:buFont typeface="Arial"/>
         <a:buChar char="•"/>
-        <a:defRPr kern="1200" sz="1500">
+        <a:defRPr sz="1500" kern="1200">
           <a:solidFill>
             <a:schemeClr val="tx1"/>
           </a:solidFill>
@@ -2928,13 +2943,13 @@
           <a:cs typeface="+mn-cs"/>
         </a:defRPr>
       </a:lvl6pPr>
-      <a:lvl7pPr algn="l" defTabSz="342900" eaLnBrk="1" hangingPunct="1" indent="-342900" latinLnBrk="0" marL="2400300" rtl="0">
+      <a:lvl7pPr marL="2400300" indent="-342900" algn="l" defTabSz="342900" rtl="0" eaLnBrk="1" latinLnBrk="0" hangingPunct="1">
         <a:spcBef>
           <a:spcPct val="20000"/>
         </a:spcBef>
         <a:buFont typeface="Arial"/>
         <a:buChar char="•"/>
-        <a:defRPr kern="1200" sz="1500">
+        <a:defRPr sz="1500" kern="1200">
           <a:solidFill>
             <a:schemeClr val="tx1"/>
           </a:solidFill>
@@ -2943,13 +2958,13 @@
           <a:cs typeface="+mn-cs"/>
         </a:defRPr>
       </a:lvl7pPr>
-      <a:lvl8pPr algn="l" defTabSz="342900" eaLnBrk="1" hangingPunct="1" indent="-342900" latinLnBrk="0" marL="2743200" rtl="0">
+      <a:lvl8pPr marL="2743200" indent="-342900" algn="l" defTabSz="342900" rtl="0" eaLnBrk="1" latinLnBrk="0" hangingPunct="1">
         <a:spcBef>
           <a:spcPct val="20000"/>
         </a:spcBef>
         <a:buFont typeface="Arial"/>
         <a:buChar char="•"/>
-        <a:defRPr kern="1200" sz="1500">
+        <a:defRPr sz="1500" kern="1200">
           <a:solidFill>
             <a:schemeClr val="tx1"/>
           </a:solidFill>
@@ -2958,13 +2973,13 @@
           <a:cs typeface="+mn-cs"/>
         </a:defRPr>
       </a:lvl8pPr>
-      <a:lvl9pPr algn="l" defTabSz="342900" eaLnBrk="1" hangingPunct="1" indent="-342900" latinLnBrk="0" marL="3086100" rtl="0">
+      <a:lvl9pPr marL="3086100" indent="-342900" algn="l" defTabSz="342900" rtl="0" eaLnBrk="1" latinLnBrk="0" hangingPunct="1">
         <a:spcBef>
           <a:spcPct val="20000"/>
         </a:spcBef>
         <a:buFont typeface="Arial"/>
         <a:buChar char="•"/>
-        <a:defRPr kern="1200" sz="1500">
+        <a:defRPr sz="1500" kern="1200">
           <a:solidFill>
             <a:schemeClr val="tx1"/>
           </a:solidFill>
@@ -2978,8 +2993,8 @@
       <a:defPPr>
         <a:defRPr lang="en-US"/>
       </a:defPPr>
-      <a:lvl1pPr algn="l" defTabSz="342900" eaLnBrk="1" hangingPunct="1" latinLnBrk="0" marL="0" rtl="0">
-        <a:defRPr kern="1200" sz="1350">
+      <a:lvl1pPr marL="0" algn="l" defTabSz="342900" rtl="0" eaLnBrk="1" latinLnBrk="0" hangingPunct="1">
+        <a:defRPr sz="1350" kern="1200">
           <a:solidFill>
             <a:schemeClr val="tx1"/>
           </a:solidFill>
@@ -2988,8 +3003,8 @@
           <a:cs typeface="+mn-cs"/>
         </a:defRPr>
       </a:lvl1pPr>
-      <a:lvl2pPr algn="l" defTabSz="342900" eaLnBrk="1" hangingPunct="1" latinLnBrk="0" marL="342900" rtl="0">
-        <a:defRPr kern="1200" sz="1350">
+      <a:lvl2pPr marL="342900" algn="l" defTabSz="342900" rtl="0" eaLnBrk="1" latinLnBrk="0" hangingPunct="1">
+        <a:defRPr sz="1350" kern="1200">
           <a:solidFill>
             <a:schemeClr val="tx1"/>
           </a:solidFill>
@@ -2998,8 +3013,8 @@
           <a:cs typeface="+mn-cs"/>
         </a:defRPr>
       </a:lvl2pPr>
-      <a:lvl3pPr algn="l" defTabSz="342900" eaLnBrk="1" hangingPunct="1" latinLnBrk="0" marL="685800" rtl="0">
-        <a:defRPr kern="1200" sz="1350">
+      <a:lvl3pPr marL="685800" algn="l" defTabSz="342900" rtl="0" eaLnBrk="1" latinLnBrk="0" hangingPunct="1">
+        <a:defRPr sz="1350" kern="1200">
           <a:solidFill>
             <a:schemeClr val="tx1"/>
           </a:solidFill>
@@ -3008,8 +3023,8 @@
           <a:cs typeface="+mn-cs"/>
         </a:defRPr>
       </a:lvl3pPr>
-      <a:lvl4pPr algn="l" defTabSz="342900" eaLnBrk="1" hangingPunct="1" latinLnBrk="0" marL="1028700" rtl="0">
-        <a:defRPr kern="1200" sz="1350">
+      <a:lvl4pPr marL="1028700" algn="l" defTabSz="342900" rtl="0" eaLnBrk="1" latinLnBrk="0" hangingPunct="1">
+        <a:defRPr sz="1350" kern="1200">
           <a:solidFill>
             <a:schemeClr val="tx1"/>
           </a:solidFill>
@@ -3018,8 +3033,8 @@
           <a:cs typeface="+mn-cs"/>
         </a:defRPr>
       </a:lvl4pPr>
-      <a:lvl5pPr algn="l" defTabSz="342900" eaLnBrk="1" hangingPunct="1" latinLnBrk="0" marL="1371600" rtl="0">
-        <a:defRPr kern="1200" sz="1350">
+      <a:lvl5pPr marL="1371600" algn="l" defTabSz="342900" rtl="0" eaLnBrk="1" latinLnBrk="0" hangingPunct="1">
+        <a:defRPr sz="1350" kern="1200">
           <a:solidFill>
             <a:schemeClr val="tx1"/>
           </a:solidFill>
@@ -3028,8 +3043,8 @@
           <a:cs typeface="+mn-cs"/>
         </a:defRPr>
       </a:lvl5pPr>
-      <a:lvl6pPr algn="l" defTabSz="342900" eaLnBrk="1" hangingPunct="1" latinLnBrk="0" marL="1714500" rtl="0">
-        <a:defRPr kern="1200" sz="1350">
+      <a:lvl6pPr marL="1714500" algn="l" defTabSz="342900" rtl="0" eaLnBrk="1" latinLnBrk="0" hangingPunct="1">
+        <a:defRPr sz="1350" kern="1200">
           <a:solidFill>
             <a:schemeClr val="tx1"/>
           </a:solidFill>
@@ -3038,8 +3053,8 @@
           <a:cs typeface="+mn-cs"/>
         </a:defRPr>
       </a:lvl6pPr>
-      <a:lvl7pPr algn="l" defTabSz="342900" eaLnBrk="1" hangingPunct="1" latinLnBrk="0" marL="2057400" rtl="0">
-        <a:defRPr kern="1200" sz="1350">
+      <a:lvl7pPr marL="2057400" algn="l" defTabSz="342900" rtl="0" eaLnBrk="1" latinLnBrk="0" hangingPunct="1">
+        <a:defRPr sz="1350" kern="1200">
           <a:solidFill>
             <a:schemeClr val="tx1"/>
           </a:solidFill>
@@ -3048,8 +3063,8 @@
           <a:cs typeface="+mn-cs"/>
         </a:defRPr>
       </a:lvl7pPr>
-      <a:lvl8pPr algn="l" defTabSz="342900" eaLnBrk="1" hangingPunct="1" latinLnBrk="0" marL="2400300" rtl="0">
-        <a:defRPr kern="1200" sz="1350">
+      <a:lvl8pPr marL="2400300" algn="l" defTabSz="342900" rtl="0" eaLnBrk="1" latinLnBrk="0" hangingPunct="1">
+        <a:defRPr sz="1350" kern="1200">
           <a:solidFill>
             <a:schemeClr val="tx1"/>
           </a:solidFill>
@@ -3058,8 +3073,8 @@
           <a:cs typeface="+mn-cs"/>
         </a:defRPr>
       </a:lvl8pPr>
-      <a:lvl9pPr algn="l" defTabSz="342900" eaLnBrk="1" hangingPunct="1" latinLnBrk="0" marL="2743200" rtl="0">
-        <a:defRPr kern="1200" sz="1350">
+      <a:lvl9pPr marL="2743200" algn="l" defTabSz="342900" rtl="0" eaLnBrk="1" latinLnBrk="0" hangingPunct="1">
+        <a:defRPr sz="1350" kern="1200">
           <a:solidFill>
             <a:schemeClr val="tx1"/>
           </a:solidFill>
@@ -3110,11 +3125,10 @@
           <a:bodyPr/>
           <a:lstStyle/>
           <a:p>
-            <a:pPr lvl="0" indent="0" marL="0">
-              <a:buNone/>
-            </a:pPr>
-            <a:r>
-              <a:rPr/>
+            <a:pPr marL="0" lvl="0" indent="0">
+              <a:buNone/>
+            </a:pPr>
+            <a:r>
               <a:t>Todd_Garner_DS6306_Week6_FLS</a:t>
             </a:r>
           </a:p>
@@ -3127,7 +3141,7 @@
             <a:spLocks noGrp="1"/>
           </p:cNvSpPr>
           <p:nvPr>
-            <p:ph idx="1" type="subTitle"/>
+            <p:ph type="subTitle" idx="1"/>
           </p:nvPr>
         </p:nvSpPr>
         <p:spPr>
@@ -3140,13 +3154,12 @@
           <a:bodyPr/>
           <a:lstStyle/>
           <a:p>
-            <a:pPr lvl="0" indent="0" marL="0">
+            <a:pPr marL="0" lvl="0" indent="0">
               <a:buNone/>
             </a:pPr>
             <a:br/>
             <a:br/>
             <a:r>
-              <a:rPr/>
               <a:t>Todd Garner</a:t>
             </a:r>
           </a:p>
@@ -3159,26 +3172,2413 @@
             <a:spLocks noGrp="1"/>
           </p:cNvSpPr>
           <p:nvPr>
-            <p:ph idx="10" sz="half" type="dt"/>
-          </p:nvPr>
-        </p:nvSpPr>
-        <p:spPr/>
-        <p:txBody>
-          <a:bodyPr/>
-          <a:lstStyle/>
-          <a:p>
-            <a:pPr lvl="0" indent="0" marL="0">
-              <a:buNone/>
-            </a:pPr>
-            <a:r>
-              <a:rPr/>
+            <p:ph type="dt" sz="half" idx="10"/>
+          </p:nvPr>
+        </p:nvSpPr>
+        <p:spPr/>
+        <p:txBody>
+          <a:bodyPr/>
+          <a:lstStyle/>
+          <a:p>
+            <a:pPr marL="0" lvl="0" indent="0">
+              <a:buNone/>
+            </a:pPr>
+            <a:r>
               <a:t>2023-02-05</a:t>
+            </a:r>
+          </a:p>
+        </p:txBody>
+      </p:sp>
+      <p:sp>
+        <p:nvSpPr>
+          <p:cNvPr id="5" name="TextBox 4">
+            <a:extLst>
+              <a:ext uri="{FF2B5EF4-FFF2-40B4-BE49-F238E27FC236}">
+                <a16:creationId xmlns:a16="http://schemas.microsoft.com/office/drawing/2014/main" id="{CA8983FB-3AEA-3CF5-6B1E-070A4BC9BE10}"/>
+              </a:ext>
+            </a:extLst>
+          </p:cNvPr>
+          <p:cNvSpPr txBox="1"/>
+          <p:nvPr/>
+        </p:nvSpPr>
+        <p:spPr>
+          <a:xfrm>
+            <a:off x="1371600" y="2793442"/>
+            <a:ext cx="6124470" cy="577081"/>
+          </a:xfrm>
+          <a:prstGeom prst="rect">
+            <a:avLst/>
+          </a:prstGeom>
+          <a:noFill/>
+        </p:spPr>
+        <p:txBody>
+          <a:bodyPr wrap="square" rtlCol="0">
+            <a:spAutoFit/>
+          </a:bodyPr>
+          <a:lstStyle/>
+          <a:p>
+            <a:r>
+              <a:rPr lang="en-US" sz="1050" dirty="0">
+                <a:solidFill>
+                  <a:srgbClr val="FF0000"/>
+                </a:solidFill>
+              </a:rPr>
+              <a:t>Bivin, my apologies for this output.  I need practice on knitting to PPT.  No idea where my graphics are.  I did save it to PDF as well, but still no graphics.  The graphics are found in the .</a:t>
+            </a:r>
+            <a:r>
+              <a:rPr lang="en-US" sz="1050" dirty="0" err="1">
+                <a:solidFill>
+                  <a:srgbClr val="FF0000"/>
+                </a:solidFill>
+              </a:rPr>
+              <a:t>Rmd</a:t>
+            </a:r>
+            <a:r>
+              <a:rPr lang="en-US" sz="1050" dirty="0">
+                <a:solidFill>
+                  <a:srgbClr val="FF0000"/>
+                </a:solidFill>
+              </a:rPr>
+              <a:t> file.  This is really poor production quality.  But, I think the work was done correctly.  </a:t>
             </a:r>
           </a:p>
         </p:txBody>
       </p:sp>
     </p:spTree>
   </p:cSld>
+  <p:clrMapOvr>
+    <a:masterClrMapping/>
+  </p:clrMapOvr>
+</p:sld>
+</file>
+
+<file path=ppt/slides/slide10.xml><?xml version="1.0" encoding="utf-8"?>
+<p:sld xmlns:a="http://schemas.openxmlformats.org/drawingml/2006/main" xmlns:r="http://schemas.openxmlformats.org/officeDocument/2006/relationships" xmlns:p="http://schemas.openxmlformats.org/presentationml/2006/main">
+  <p:cSld>
+    <p:spTree>
+      <p:nvGrpSpPr>
+        <p:cNvPr id="1" name=""/>
+        <p:cNvGrpSpPr/>
+        <p:nvPr/>
+      </p:nvGrpSpPr>
+      <p:grpSpPr>
+        <a:xfrm>
+          <a:off x="0" y="0"/>
+          <a:ext cx="0" cy="0"/>
+          <a:chOff x="0" y="0"/>
+          <a:chExt cx="0" cy="0"/>
+        </a:xfrm>
+      </p:grpSpPr>
+      <p:sp>
+        <p:nvSpPr>
+          <p:cNvPr id="2" name="Title 1"/>
+          <p:cNvSpPr>
+            <a:spLocks noGrp="1"/>
+          </p:cNvSpPr>
+          <p:nvPr>
+            <p:ph type="title"/>
+          </p:nvPr>
+        </p:nvSpPr>
+        <p:spPr/>
+        <p:txBody>
+          <a:bodyPr/>
+          <a:lstStyle/>
+          <a:p>
+            <a:pPr marL="0" lvl="0" indent="0">
+              <a:buNone/>
+            </a:pPr>
+            <a:r>
+              <a:t>Evaluate the accuracy of the model</a:t>
+            </a:r>
+          </a:p>
+        </p:txBody>
+      </p:sp>
+      <p:sp>
+        <p:nvSpPr>
+          <p:cNvPr id="3" name="Content Placeholder 2"/>
+          <p:cNvSpPr>
+            <a:spLocks noGrp="1"/>
+          </p:cNvSpPr>
+          <p:nvPr>
+            <p:ph idx="1"/>
+          </p:nvPr>
+        </p:nvSpPr>
+        <p:spPr/>
+        <p:txBody>
+          <a:bodyPr>
+            <a:normAutofit lnSpcReduction="10000"/>
+          </a:bodyPr>
+          <a:lstStyle/>
+          <a:p>
+            <a:pPr marL="0" lvl="0" indent="0">
+              <a:buNone/>
+            </a:pPr>
+            <a:r>
+              <a:rPr dirty="0"/>
+              <a:t>mean(pred == test[, 2])</a:t>
+            </a:r>
+          </a:p>
+          <a:p>
+            <a:pPr marL="0" lvl="0" indent="0">
+              <a:buNone/>
+            </a:pPr>
+            <a:r>
+              <a:rPr dirty="0"/>
+              <a:t>I will have to modify the code to load the training data set.</a:t>
+            </a:r>
+          </a:p>
+          <a:p>
+            <a:pPr marL="0" lvl="0" indent="0">
+              <a:buNone/>
+            </a:pPr>
+            <a:r>
+              <a:rPr i="1" dirty="0"/>
+              <a:t>Many hours later after trying to mold the </a:t>
+            </a:r>
+            <a:r>
+              <a:rPr i="1" dirty="0" err="1"/>
+              <a:t>ChatGPT</a:t>
+            </a:r>
+            <a:r>
+              <a:rPr i="1" dirty="0"/>
+              <a:t> code into a workable solution, discarding it and following an article on Edureka.co, I’ve thrown up my hands. The </a:t>
+            </a:r>
+            <a:r>
+              <a:rPr i="1" dirty="0" err="1"/>
+              <a:t>Edureka</a:t>
+            </a:r>
+            <a:r>
+              <a:rPr i="1" dirty="0"/>
+              <a:t> explanation makes perfect sense but I’m just not able to get it to work. So, I’m back here at the start to contemplate, “What is it that I’m really trying to accomplish?” I’ve used the Kaggle data sets and I’ve defaulted back to the .csv files in the GitHub repo. So, I’m on #2.</a:t>
+            </a:r>
+          </a:p>
+        </p:txBody>
+      </p:sp>
+    </p:spTree>
+  </p:cSld>
+  <p:clrMapOvr>
+    <a:masterClrMapping/>
+  </p:clrMapOvr>
+</p:sld>
+</file>
+
+<file path=ppt/slides/slide11.xml><?xml version="1.0" encoding="utf-8"?>
+<p:sld xmlns:a="http://schemas.openxmlformats.org/drawingml/2006/main" xmlns:r="http://schemas.openxmlformats.org/officeDocument/2006/relationships" xmlns:p="http://schemas.openxmlformats.org/presentationml/2006/main">
+  <p:cSld>
+    <p:spTree>
+      <p:nvGrpSpPr>
+        <p:cNvPr id="1" name=""/>
+        <p:cNvGrpSpPr/>
+        <p:nvPr/>
+      </p:nvGrpSpPr>
+      <p:grpSpPr>
+        <a:xfrm>
+          <a:off x="0" y="0"/>
+          <a:ext cx="0" cy="0"/>
+          <a:chOff x="0" y="0"/>
+          <a:chExt cx="0" cy="0"/>
+        </a:xfrm>
+      </p:grpSpPr>
+      <p:sp>
+        <p:nvSpPr>
+          <p:cNvPr id="2" name="Title 1">
+            <a:extLst>
+              <a:ext uri="{FF2B5EF4-FFF2-40B4-BE49-F238E27FC236}">
+                <a16:creationId xmlns:a16="http://schemas.microsoft.com/office/drawing/2014/main" id="{BFB2995C-DBD2-BC9D-1189-E601888B5855}"/>
+              </a:ext>
+            </a:extLst>
+          </p:cNvPr>
+          <p:cNvSpPr>
+            <a:spLocks noGrp="1"/>
+          </p:cNvSpPr>
+          <p:nvPr>
+            <p:ph type="title"/>
+          </p:nvPr>
+        </p:nvSpPr>
+        <p:spPr/>
+        <p:txBody>
+          <a:bodyPr/>
+          <a:lstStyle/>
+          <a:p>
+            <a:endParaRPr lang="en-US"/>
+          </a:p>
+        </p:txBody>
+      </p:sp>
+      <p:sp>
+        <p:nvSpPr>
+          <p:cNvPr id="3" name="Content Placeholder 2">
+            <a:extLst>
+              <a:ext uri="{FF2B5EF4-FFF2-40B4-BE49-F238E27FC236}">
+                <a16:creationId xmlns:a16="http://schemas.microsoft.com/office/drawing/2014/main" id="{814CD029-40A7-C9D1-9586-E977EDD0D9AF}"/>
+              </a:ext>
+            </a:extLst>
+          </p:cNvPr>
+          <p:cNvSpPr>
+            <a:spLocks noGrp="1"/>
+          </p:cNvSpPr>
+          <p:nvPr>
+            <p:ph idx="1"/>
+          </p:nvPr>
+        </p:nvSpPr>
+        <p:spPr/>
+        <p:txBody>
+          <a:bodyPr>
+            <a:normAutofit fontScale="25000" lnSpcReduction="20000"/>
+          </a:bodyPr>
+          <a:lstStyle/>
+          <a:p>
+            <a:pPr marL="0" lvl="0" indent="0">
+              <a:buNone/>
+            </a:pPr>
+            <a:r>
+              <a:rPr lang="en-US" b="1" dirty="0"/>
+              <a:t>Use KNN to classify those who survived and died based on Age and class.</a:t>
+            </a:r>
+            <a:r>
+              <a:rPr lang="en-US" dirty="0"/>
+              <a:t> In other words, find a way to model whether a passenger lived or died based on Age and </a:t>
+            </a:r>
+            <a:r>
+              <a:rPr lang="en-US" dirty="0" err="1"/>
+              <a:t>Pclass</a:t>
+            </a:r>
+            <a:r>
+              <a:rPr lang="en-US" dirty="0"/>
+              <a:t> (1st, 2nd or 3rd class passage). Solving for lived or died based on these two columns and the values within them. I will search my code to see where I’ve gone wrong.</a:t>
+            </a:r>
+          </a:p>
+          <a:p>
+            <a:pPr lvl="0" indent="0">
+              <a:buNone/>
+            </a:pPr>
+            <a:r>
+              <a:rPr lang="en-US" dirty="0">
+                <a:latin typeface="Courier"/>
+              </a:rPr>
+              <a:t>## Warning: package '</a:t>
+            </a:r>
+            <a:r>
+              <a:rPr lang="en-US" dirty="0" err="1">
+                <a:latin typeface="Courier"/>
+              </a:rPr>
+              <a:t>dplyr</a:t>
+            </a:r>
+            <a:r>
+              <a:rPr lang="en-US" dirty="0">
+                <a:latin typeface="Courier"/>
+              </a:rPr>
+              <a:t>' was built under R version 4.2.2</a:t>
+            </a:r>
+          </a:p>
+          <a:p>
+            <a:pPr lvl="0" indent="0">
+              <a:buNone/>
+            </a:pPr>
+            <a:r>
+              <a:rPr lang="en-US" dirty="0">
+                <a:latin typeface="Courier"/>
+              </a:rPr>
+              <a:t>## 
+## Attaching package: '</a:t>
+            </a:r>
+            <a:r>
+              <a:rPr lang="en-US" dirty="0" err="1">
+                <a:latin typeface="Courier"/>
+              </a:rPr>
+              <a:t>dplyr</a:t>
+            </a:r>
+            <a:r>
+              <a:rPr lang="en-US" dirty="0">
+                <a:latin typeface="Courier"/>
+              </a:rPr>
+              <a:t>'</a:t>
+            </a:r>
+          </a:p>
+          <a:p>
+            <a:pPr lvl="0" indent="0">
+              <a:buNone/>
+            </a:pPr>
+            <a:r>
+              <a:rPr lang="en-US" dirty="0">
+                <a:latin typeface="Courier"/>
+              </a:rPr>
+              <a:t>## The following objects are masked from '</a:t>
+            </a:r>
+            <a:r>
+              <a:rPr lang="en-US" dirty="0" err="1">
+                <a:latin typeface="Courier"/>
+              </a:rPr>
+              <a:t>package:stats</a:t>
+            </a:r>
+            <a:r>
+              <a:rPr lang="en-US" dirty="0">
+                <a:latin typeface="Courier"/>
+              </a:rPr>
+              <a:t>':
+## 
+##     filter, lag</a:t>
+            </a:r>
+          </a:p>
+          <a:p>
+            <a:pPr lvl="0" indent="0">
+              <a:buNone/>
+            </a:pPr>
+            <a:r>
+              <a:rPr lang="en-US" dirty="0">
+                <a:latin typeface="Courier"/>
+              </a:rPr>
+              <a:t>## The following objects are masked from '</a:t>
+            </a:r>
+            <a:r>
+              <a:rPr lang="en-US" dirty="0" err="1">
+                <a:latin typeface="Courier"/>
+              </a:rPr>
+              <a:t>package:base</a:t>
+            </a:r>
+            <a:r>
+              <a:rPr lang="en-US" dirty="0">
+                <a:latin typeface="Courier"/>
+              </a:rPr>
+              <a:t>':
+## 
+##     intersect, </a:t>
+            </a:r>
+            <a:r>
+              <a:rPr lang="en-US" dirty="0" err="1">
+                <a:latin typeface="Courier"/>
+              </a:rPr>
+              <a:t>setdiff</a:t>
+            </a:r>
+            <a:r>
+              <a:rPr lang="en-US" dirty="0">
+                <a:latin typeface="Courier"/>
+              </a:rPr>
+              <a:t>, </a:t>
+            </a:r>
+            <a:r>
+              <a:rPr lang="en-US" dirty="0" err="1">
+                <a:latin typeface="Courier"/>
+              </a:rPr>
+              <a:t>setequal</a:t>
+            </a:r>
+            <a:r>
+              <a:rPr lang="en-US" dirty="0">
+                <a:latin typeface="Courier"/>
+              </a:rPr>
+              <a:t>, union</a:t>
+            </a:r>
+          </a:p>
+          <a:p>
+            <a:pPr marL="0" lvl="0" indent="0">
+              <a:spcBef>
+                <a:spcPts val="3000"/>
+              </a:spcBef>
+              <a:buNone/>
+            </a:pPr>
+            <a:r>
+              <a:rPr lang="en-US" b="1" dirty="0"/>
+              <a:t>Holy smokes! That removed 177 rows! That explains volumes of why I was having issues before. Well, better late than never. Let’s roll on.</a:t>
+            </a:r>
+          </a:p>
+          <a:p>
+            <a:pPr marL="0" lvl="0" indent="0">
+              <a:buNone/>
+            </a:pPr>
+            <a:r>
+              <a:rPr lang="en-US" dirty="0"/>
+              <a:t>Previously, I had loaded up </a:t>
+            </a:r>
+            <a:r>
+              <a:rPr lang="en-US" dirty="0" err="1"/>
+              <a:t>ChatGPT</a:t>
+            </a:r>
+            <a:r>
+              <a:rPr lang="en-US" dirty="0"/>
+              <a:t> with the question. And, I likely posed the wrong question which is why I just flailed. The comments below were from hours ago. I’ll leave them there for reference.</a:t>
+            </a:r>
+          </a:p>
+          <a:p>
+            <a:pPr marL="0" lvl="0" indent="0">
+              <a:buNone/>
+            </a:pPr>
+            <a:r>
+              <a:rPr lang="en-US" dirty="0"/>
+              <a:t>I had to modify quite a bit to make it work. Part of the problem is that I worded the question incorrectly and it assumed I would use the training set in two subsets. I will have to repair this error. I could resubmit my question correctly, but I think I can work with this. On further reflection, perhaps it’s not such a bad idea to use the training set, broken down 80/20 to train the model. I can then accurately test the validity of the model. Then, I’ll run the full test set through and see what the results are.</a:t>
+            </a:r>
+          </a:p>
+          <a:p>
+            <a:pPr marL="0" lvl="0" indent="0">
+              <a:buNone/>
+            </a:pPr>
+            <a:r>
+              <a:rPr lang="en-US" dirty="0"/>
+              <a:t>UPDATE: I’m moving on with my code below.</a:t>
+            </a:r>
+          </a:p>
+          <a:p>
+            <a:pPr lvl="0" indent="0">
+              <a:buNone/>
+            </a:pPr>
+            <a:r>
+              <a:rPr lang="en-US" dirty="0">
+                <a:latin typeface="Courier"/>
+              </a:rPr>
+              <a:t>## Warning: package 'class' was built under R version 4.2.2</a:t>
+            </a:r>
+          </a:p>
+          <a:p>
+            <a:pPr lvl="0" indent="0">
+              <a:buNone/>
+            </a:pPr>
+            <a:r>
+              <a:rPr lang="en-US" dirty="0">
+                <a:latin typeface="Courier"/>
+              </a:rPr>
+              <a:t>## Warning: package 'caret' was built under R version 4.2.2</a:t>
+            </a:r>
+          </a:p>
+          <a:p>
+            <a:pPr lvl="0" indent="0">
+              <a:buNone/>
+            </a:pPr>
+            <a:r>
+              <a:rPr lang="en-US" dirty="0">
+                <a:latin typeface="Courier"/>
+              </a:rPr>
+              <a:t>## Loading required package: ggplot2</a:t>
+            </a:r>
+          </a:p>
+          <a:p>
+            <a:pPr lvl="0" indent="0">
+              <a:buNone/>
+            </a:pPr>
+            <a:r>
+              <a:rPr lang="en-US" dirty="0">
+                <a:latin typeface="Courier"/>
+              </a:rPr>
+              <a:t>## Warning: package 'ggplot2' was built under R version 4.2.2</a:t>
+            </a:r>
+          </a:p>
+          <a:p>
+            <a:pPr lvl="0" indent="0">
+              <a:buNone/>
+            </a:pPr>
+            <a:r>
+              <a:rPr lang="en-US" dirty="0">
+                <a:latin typeface="Courier"/>
+              </a:rPr>
+              <a:t>## Loading required package: lattice</a:t>
+            </a:r>
+          </a:p>
+          <a:p>
+            <a:pPr lvl="0" indent="0">
+              <a:buNone/>
+            </a:pPr>
+            <a:r>
+              <a:rPr lang="en-US" dirty="0">
+                <a:latin typeface="Courier"/>
+              </a:rPr>
+              <a:t>##    knn.23
+##      0  1
+##   0 71  8
+##   1 45 19</a:t>
+            </a:r>
+          </a:p>
+          <a:p>
+            <a:pPr lvl="0" indent="0">
+              <a:buNone/>
+            </a:pPr>
+            <a:r>
+              <a:rPr lang="en-US" dirty="0">
+                <a:latin typeface="Courier"/>
+              </a:rPr>
+              <a:t>## Confusion Matrix and Statistics
+## 
+##    knn.23
+##      0  1
+##   0 71  8
+##   1 45 19
+##                                           
+</a:t>
+            </a:r>
+            <a:endParaRPr lang="en-US" dirty="0"/>
+          </a:p>
+        </p:txBody>
+      </p:sp>
+    </p:spTree>
+    <p:extLst>
+      <p:ext uri="{BB962C8B-B14F-4D97-AF65-F5344CB8AC3E}">
+        <p14:creationId xmlns:p14="http://schemas.microsoft.com/office/powerpoint/2010/main" val="4035716795"/>
+      </p:ext>
+    </p:extLst>
+  </p:cSld>
+  <p:clrMapOvr>
+    <a:masterClrMapping/>
+  </p:clrMapOvr>
+</p:sld>
+</file>
+
+<file path=ppt/slides/slide12.xml><?xml version="1.0" encoding="utf-8"?>
+<p:sld xmlns:a="http://schemas.openxmlformats.org/drawingml/2006/main" xmlns:r="http://schemas.openxmlformats.org/officeDocument/2006/relationships" xmlns:p="http://schemas.openxmlformats.org/presentationml/2006/main">
+  <p:cSld>
+    <p:spTree>
+      <p:nvGrpSpPr>
+        <p:cNvPr id="1" name=""/>
+        <p:cNvGrpSpPr/>
+        <p:nvPr/>
+      </p:nvGrpSpPr>
+      <p:grpSpPr>
+        <a:xfrm>
+          <a:off x="0" y="0"/>
+          <a:ext cx="0" cy="0"/>
+          <a:chOff x="0" y="0"/>
+          <a:chExt cx="0" cy="0"/>
+        </a:xfrm>
+      </p:grpSpPr>
+      <p:sp>
+        <p:nvSpPr>
+          <p:cNvPr id="2" name="Title 1">
+            <a:extLst>
+              <a:ext uri="{FF2B5EF4-FFF2-40B4-BE49-F238E27FC236}">
+                <a16:creationId xmlns:a16="http://schemas.microsoft.com/office/drawing/2014/main" id="{3574D7DE-D665-82E4-BEEA-222F7C2D2715}"/>
+              </a:ext>
+            </a:extLst>
+          </p:cNvPr>
+          <p:cNvSpPr>
+            <a:spLocks noGrp="1"/>
+          </p:cNvSpPr>
+          <p:nvPr>
+            <p:ph type="title"/>
+          </p:nvPr>
+        </p:nvSpPr>
+        <p:spPr/>
+        <p:txBody>
+          <a:bodyPr/>
+          <a:lstStyle/>
+          <a:p>
+            <a:endParaRPr lang="en-US"/>
+          </a:p>
+        </p:txBody>
+      </p:sp>
+      <p:sp>
+        <p:nvSpPr>
+          <p:cNvPr id="3" name="Content Placeholder 2">
+            <a:extLst>
+              <a:ext uri="{FF2B5EF4-FFF2-40B4-BE49-F238E27FC236}">
+                <a16:creationId xmlns:a16="http://schemas.microsoft.com/office/drawing/2014/main" id="{C74E49A7-F7D9-C1F5-6B0E-FC7CBCACBD8E}"/>
+              </a:ext>
+            </a:extLst>
+          </p:cNvPr>
+          <p:cNvSpPr>
+            <a:spLocks noGrp="1"/>
+          </p:cNvSpPr>
+          <p:nvPr>
+            <p:ph idx="1"/>
+          </p:nvPr>
+        </p:nvSpPr>
+        <p:spPr/>
+        <p:txBody>
+          <a:bodyPr>
+            <a:normAutofit fontScale="25000" lnSpcReduction="20000"/>
+          </a:bodyPr>
+          <a:lstStyle/>
+          <a:p>
+            <a:pPr lvl="0" indent="0">
+              <a:buNone/>
+            </a:pPr>
+            <a:r>
+              <a:rPr lang="en-US" dirty="0">
+                <a:latin typeface="Courier"/>
+              </a:rPr>
+              <a:t>##                Accuracy : 0.6294          
+##                  95% CI : (0.5447, 0.7086)
+##     No Information Rate : 0.8112          
+##     P-Value [Acc &gt; NIR] : 1               
+##                                           
+##                   Kappa : 0.207           
+##                                           
+##  </a:t>
+            </a:r>
+            <a:r>
+              <a:rPr lang="en-US" dirty="0" err="1">
+                <a:latin typeface="Courier"/>
+              </a:rPr>
+              <a:t>Mcnemar's</a:t>
+            </a:r>
+            <a:r>
+              <a:rPr lang="en-US" dirty="0">
+                <a:latin typeface="Courier"/>
+              </a:rPr>
+              <a:t> Test P-Value : 7.615e-07       
+##                                           
+##             Sensitivity : 0.6121          
+##             Specificity : 0.7037          
+##          Pos Pred Value : 0.8987          
+##          Neg Pred Value : 0.2969          
+##              Prevalence : 0.8112          
+##          Detection Rate : 0.4965          
+##    Detection Prevalence : 0.5524          
+##       Balanced Accuracy : 0.6579          
+##                                           
+##        'Positive' Class : 0               
+## </a:t>
+            </a:r>
+          </a:p>
+          <a:p>
+            <a:pPr lvl="0" indent="0">
+              <a:buNone/>
+            </a:pPr>
+            <a:r>
+              <a:rPr lang="en-US" dirty="0">
+                <a:latin typeface="Courier"/>
+              </a:rPr>
+              <a:t>##    knn.24
+##      0  1
+##   0 69 10
+##   1 46 18</a:t>
+            </a:r>
+          </a:p>
+          <a:p>
+            <a:pPr lvl="0" indent="0">
+              <a:buNone/>
+            </a:pPr>
+            <a:r>
+              <a:rPr lang="en-US" dirty="0">
+                <a:latin typeface="Courier"/>
+              </a:rPr>
+              <a:t>## Confusion Matrix and Statistics
+## 
+##    knn.24
+##      0  1
+##   0 69 10
+##   1 46 18
+##                                           
+</a:t>
+            </a:r>
+            <a:endParaRPr lang="en-US" dirty="0"/>
+          </a:p>
+        </p:txBody>
+      </p:sp>
+    </p:spTree>
+    <p:extLst>
+      <p:ext uri="{BB962C8B-B14F-4D97-AF65-F5344CB8AC3E}">
+        <p14:creationId xmlns:p14="http://schemas.microsoft.com/office/powerpoint/2010/main" val="2806580713"/>
+      </p:ext>
+    </p:extLst>
+  </p:cSld>
+  <p:clrMapOvr>
+    <a:masterClrMapping/>
+  </p:clrMapOvr>
+</p:sld>
+</file>
+
+<file path=ppt/slides/slide13.xml><?xml version="1.0" encoding="utf-8"?>
+<p:sld xmlns:a="http://schemas.openxmlformats.org/drawingml/2006/main" xmlns:r="http://schemas.openxmlformats.org/officeDocument/2006/relationships" xmlns:p="http://schemas.openxmlformats.org/presentationml/2006/main">
+  <p:cSld>
+    <p:spTree>
+      <p:nvGrpSpPr>
+        <p:cNvPr id="1" name=""/>
+        <p:cNvGrpSpPr/>
+        <p:nvPr/>
+      </p:nvGrpSpPr>
+      <p:grpSpPr>
+        <a:xfrm>
+          <a:off x="0" y="0"/>
+          <a:ext cx="0" cy="0"/>
+          <a:chOff x="0" y="0"/>
+          <a:chExt cx="0" cy="0"/>
+        </a:xfrm>
+      </p:grpSpPr>
+      <p:sp>
+        <p:nvSpPr>
+          <p:cNvPr id="2" name="Title 1">
+            <a:extLst>
+              <a:ext uri="{FF2B5EF4-FFF2-40B4-BE49-F238E27FC236}">
+                <a16:creationId xmlns:a16="http://schemas.microsoft.com/office/drawing/2014/main" id="{7230BFF2-9DDE-D4EC-DFBC-99FF38B29424}"/>
+              </a:ext>
+            </a:extLst>
+          </p:cNvPr>
+          <p:cNvSpPr>
+            <a:spLocks noGrp="1"/>
+          </p:cNvSpPr>
+          <p:nvPr>
+            <p:ph type="title"/>
+          </p:nvPr>
+        </p:nvSpPr>
+        <p:spPr/>
+        <p:txBody>
+          <a:bodyPr/>
+          <a:lstStyle/>
+          <a:p>
+            <a:endParaRPr lang="en-US"/>
+          </a:p>
+        </p:txBody>
+      </p:sp>
+      <p:sp>
+        <p:nvSpPr>
+          <p:cNvPr id="3" name="Content Placeholder 2">
+            <a:extLst>
+              <a:ext uri="{FF2B5EF4-FFF2-40B4-BE49-F238E27FC236}">
+                <a16:creationId xmlns:a16="http://schemas.microsoft.com/office/drawing/2014/main" id="{75F16239-3DF4-F036-25C5-6BBA6285B3F4}"/>
+              </a:ext>
+            </a:extLst>
+          </p:cNvPr>
+          <p:cNvSpPr>
+            <a:spLocks noGrp="1"/>
+          </p:cNvSpPr>
+          <p:nvPr>
+            <p:ph idx="1"/>
+          </p:nvPr>
+        </p:nvSpPr>
+        <p:spPr/>
+        <p:txBody>
+          <a:bodyPr>
+            <a:normAutofit fontScale="32500" lnSpcReduction="20000"/>
+          </a:bodyPr>
+          <a:lstStyle/>
+          <a:p>
+            <a:pPr lvl="0" indent="0">
+              <a:buNone/>
+            </a:pPr>
+            <a:r>
+              <a:rPr lang="en-US" dirty="0">
+                <a:latin typeface="Courier"/>
+              </a:rPr>
+              <a:t>##                Accuracy : 0.6084          
+##                  95% CI : (0.5233, 0.6889)
+##     No Information Rate : 0.8042          
+##     P-Value [Acc &gt; NIR] : 1               
+##                                           
+##                   Kappa : 0.1634          
+##                                           
+##  </a:t>
+            </a:r>
+            <a:r>
+              <a:rPr lang="en-US" dirty="0" err="1">
+                <a:latin typeface="Courier"/>
+              </a:rPr>
+              <a:t>Mcnemar's</a:t>
+            </a:r>
+            <a:r>
+              <a:rPr lang="en-US" dirty="0">
+                <a:latin typeface="Courier"/>
+              </a:rPr>
+              <a:t> Test P-Value : 2.91e-06        
+##                                           
+##             Sensitivity : 0.6000          
+##             Specificity : 0.6429          
+##          Pos Pred Value : 0.8734          
+##          Neg Pred Value : 0.2813          
+##              Prevalence : 0.8042          
+##          Detection Rate : 0.4825          
+##    Detection Prevalence : 0.5524          
+##       Balanced Accuracy : 0.6214          
+##                                           
+##        'Positive' Class : 0               
+## </a:t>
+            </a:r>
+          </a:p>
+          <a:p>
+            <a:pPr marL="0" lvl="0" indent="0">
+              <a:buNone/>
+            </a:pPr>
+            <a:r>
+              <a:rPr lang="en-US" dirty="0"/>
+              <a:t>Sweet Mama! I did it!!!! Man, that was laborious! But, it feels good to have solved it.</a:t>
+            </a:r>
+          </a:p>
+          <a:p>
+            <a:pPr marL="0" lvl="0" indent="0">
+              <a:buNone/>
+            </a:pPr>
+            <a:r>
+              <a:rPr lang="en-US" dirty="0"/>
+              <a:t>Okay, now onto #3.</a:t>
+            </a:r>
+          </a:p>
+        </p:txBody>
+      </p:sp>
+    </p:spTree>
+    <p:extLst>
+      <p:ext uri="{BB962C8B-B14F-4D97-AF65-F5344CB8AC3E}">
+        <p14:creationId xmlns:p14="http://schemas.microsoft.com/office/powerpoint/2010/main" val="3867669831"/>
+      </p:ext>
+    </p:extLst>
+  </p:cSld>
+  <p:clrMapOvr>
+    <a:masterClrMapping/>
+  </p:clrMapOvr>
+</p:sld>
+</file>
+
+<file path=ppt/slides/slide14.xml><?xml version="1.0" encoding="utf-8"?>
+<p:sld xmlns:a="http://schemas.openxmlformats.org/drawingml/2006/main" xmlns:r="http://schemas.openxmlformats.org/officeDocument/2006/relationships" xmlns:p="http://schemas.openxmlformats.org/presentationml/2006/main">
+  <p:cSld>
+    <p:spTree>
+      <p:nvGrpSpPr>
+        <p:cNvPr id="1" name=""/>
+        <p:cNvGrpSpPr/>
+        <p:nvPr/>
+      </p:nvGrpSpPr>
+      <p:grpSpPr>
+        <a:xfrm>
+          <a:off x="0" y="0"/>
+          <a:ext cx="0" cy="0"/>
+          <a:chOff x="0" y="0"/>
+          <a:chExt cx="0" cy="0"/>
+        </a:xfrm>
+      </p:grpSpPr>
+      <p:sp>
+        <p:nvSpPr>
+          <p:cNvPr id="2" name="Title 1">
+            <a:extLst>
+              <a:ext uri="{FF2B5EF4-FFF2-40B4-BE49-F238E27FC236}">
+                <a16:creationId xmlns:a16="http://schemas.microsoft.com/office/drawing/2014/main" id="{02AD314C-15D1-DF26-13A2-98F1A39E8764}"/>
+              </a:ext>
+            </a:extLst>
+          </p:cNvPr>
+          <p:cNvSpPr>
+            <a:spLocks noGrp="1"/>
+          </p:cNvSpPr>
+          <p:nvPr>
+            <p:ph type="title"/>
+          </p:nvPr>
+        </p:nvSpPr>
+        <p:spPr/>
+        <p:txBody>
+          <a:bodyPr/>
+          <a:lstStyle/>
+          <a:p>
+            <a:endParaRPr lang="en-US"/>
+          </a:p>
+        </p:txBody>
+      </p:sp>
+      <p:sp>
+        <p:nvSpPr>
+          <p:cNvPr id="3" name="Content Placeholder 2">
+            <a:extLst>
+              <a:ext uri="{FF2B5EF4-FFF2-40B4-BE49-F238E27FC236}">
+                <a16:creationId xmlns:a16="http://schemas.microsoft.com/office/drawing/2014/main" id="{AD524F10-CA0F-97D5-B7ED-B2987C4319CD}"/>
+              </a:ext>
+            </a:extLst>
+          </p:cNvPr>
+          <p:cNvSpPr>
+            <a:spLocks noGrp="1"/>
+          </p:cNvSpPr>
+          <p:nvPr>
+            <p:ph idx="1"/>
+          </p:nvPr>
+        </p:nvSpPr>
+        <p:spPr/>
+        <p:txBody>
+          <a:bodyPr>
+            <a:normAutofit fontScale="25000" lnSpcReduction="20000"/>
+          </a:bodyPr>
+          <a:lstStyle/>
+          <a:p>
+            <a:pPr marL="0" lvl="0" indent="0">
+              <a:spcBef>
+                <a:spcPts val="3000"/>
+              </a:spcBef>
+              <a:buNone/>
+            </a:pPr>
+            <a:r>
+              <a:rPr lang="en-US" b="1" dirty="0"/>
+              <a:t>Use your age and predict your survival based on each of the ticket classes.</a:t>
+            </a:r>
+          </a:p>
+          <a:p>
+            <a:pPr lvl="0" indent="0">
+              <a:buNone/>
+            </a:pPr>
+            <a:r>
+              <a:rPr lang="en-US" dirty="0">
+                <a:latin typeface="Courier"/>
+              </a:rPr>
+              <a:t>##    knn.23
+##      0  1
+##   0 71  8
+##   1 45 19</a:t>
+            </a:r>
+          </a:p>
+          <a:p>
+            <a:pPr lvl="0" indent="0">
+              <a:buNone/>
+            </a:pPr>
+            <a:r>
+              <a:rPr lang="en-US" dirty="0">
+                <a:latin typeface="Courier"/>
+              </a:rPr>
+              <a:t>## Confusion Matrix and Statistics
+## 
+##    knn.23
+##      0  1
+##   0 71  8
+##   1 45 19
+##                                           
+##                Accuracy : 0.6294          
+##                  95% CI : (0.5447, 0.7086)
+##     No Information Rate : 0.8112          
+##     P-Value [Acc &gt; NIR] : 1               
+##                                           
+##                   Kappa : 0.207           
+##                                           
+##  </a:t>
+            </a:r>
+            <a:r>
+              <a:rPr lang="en-US" dirty="0" err="1">
+                <a:latin typeface="Courier"/>
+              </a:rPr>
+              <a:t>Mcnemar's</a:t>
+            </a:r>
+            <a:r>
+              <a:rPr lang="en-US" dirty="0">
+                <a:latin typeface="Courier"/>
+              </a:rPr>
+              <a:t> Test P-Value : 7.615e-07       
+##                                           
+##             Sensitivity : 0.6121          
+##             Specificity : 0.7037          
+##          Pos Pred Value : 0.8987          
+##          Neg Pred Value : 0.2969          
+##              Prevalence : 0.8112          
+##          Detection Rate : 0.4965          
+##    Detection Prevalence : 0.5524          
+##       Balanced Accuracy : 0.6579          
+##                                           
+</a:t>
+            </a:r>
+            <a:endParaRPr lang="en-US" dirty="0"/>
+          </a:p>
+        </p:txBody>
+      </p:sp>
+    </p:spTree>
+    <p:extLst>
+      <p:ext uri="{BB962C8B-B14F-4D97-AF65-F5344CB8AC3E}">
+        <p14:creationId xmlns:p14="http://schemas.microsoft.com/office/powerpoint/2010/main" val="4009029735"/>
+      </p:ext>
+    </p:extLst>
+  </p:cSld>
+  <p:clrMapOvr>
+    <a:masterClrMapping/>
+  </p:clrMapOvr>
+</p:sld>
+</file>
+
+<file path=ppt/slides/slide15.xml><?xml version="1.0" encoding="utf-8"?>
+<p:sld xmlns:a="http://schemas.openxmlformats.org/drawingml/2006/main" xmlns:r="http://schemas.openxmlformats.org/officeDocument/2006/relationships" xmlns:p="http://schemas.openxmlformats.org/presentationml/2006/main">
+  <p:cSld>
+    <p:spTree>
+      <p:nvGrpSpPr>
+        <p:cNvPr id="1" name=""/>
+        <p:cNvGrpSpPr/>
+        <p:nvPr/>
+      </p:nvGrpSpPr>
+      <p:grpSpPr>
+        <a:xfrm>
+          <a:off x="0" y="0"/>
+          <a:ext cx="0" cy="0"/>
+          <a:chOff x="0" y="0"/>
+          <a:chExt cx="0" cy="0"/>
+        </a:xfrm>
+      </p:grpSpPr>
+      <p:sp>
+        <p:nvSpPr>
+          <p:cNvPr id="2" name="Title 1">
+            <a:extLst>
+              <a:ext uri="{FF2B5EF4-FFF2-40B4-BE49-F238E27FC236}">
+                <a16:creationId xmlns:a16="http://schemas.microsoft.com/office/drawing/2014/main" id="{9CF9A33C-A24E-19D3-9C82-072658FDA3F6}"/>
+              </a:ext>
+            </a:extLst>
+          </p:cNvPr>
+          <p:cNvSpPr>
+            <a:spLocks noGrp="1"/>
+          </p:cNvSpPr>
+          <p:nvPr>
+            <p:ph type="title"/>
+          </p:nvPr>
+        </p:nvSpPr>
+        <p:spPr/>
+        <p:txBody>
+          <a:bodyPr/>
+          <a:lstStyle/>
+          <a:p>
+            <a:endParaRPr lang="en-US"/>
+          </a:p>
+        </p:txBody>
+      </p:sp>
+      <p:sp>
+        <p:nvSpPr>
+          <p:cNvPr id="3" name="Content Placeholder 2">
+            <a:extLst>
+              <a:ext uri="{FF2B5EF4-FFF2-40B4-BE49-F238E27FC236}">
+                <a16:creationId xmlns:a16="http://schemas.microsoft.com/office/drawing/2014/main" id="{D30FB517-A844-9D2B-46A7-83857028AF9E}"/>
+              </a:ext>
+            </a:extLst>
+          </p:cNvPr>
+          <p:cNvSpPr>
+            <a:spLocks noGrp="1"/>
+          </p:cNvSpPr>
+          <p:nvPr>
+            <p:ph idx="1"/>
+          </p:nvPr>
+        </p:nvSpPr>
+        <p:spPr/>
+        <p:txBody>
+          <a:bodyPr/>
+          <a:lstStyle/>
+          <a:p>
+            <a:endParaRPr lang="en-US"/>
+          </a:p>
+        </p:txBody>
+      </p:sp>
+      <p:sp>
+        <p:nvSpPr>
+          <p:cNvPr id="5" name="TextBox 4">
+            <a:extLst>
+              <a:ext uri="{FF2B5EF4-FFF2-40B4-BE49-F238E27FC236}">
+                <a16:creationId xmlns:a16="http://schemas.microsoft.com/office/drawing/2014/main" id="{6B69D8E2-230E-1E32-3AFD-131EF6D356A4}"/>
+              </a:ext>
+            </a:extLst>
+          </p:cNvPr>
+          <p:cNvSpPr txBox="1"/>
+          <p:nvPr/>
+        </p:nvSpPr>
+        <p:spPr>
+          <a:xfrm>
+            <a:off x="2286000" y="-6391614"/>
+            <a:ext cx="4572000" cy="10895290"/>
+          </a:xfrm>
+          <a:prstGeom prst="rect">
+            <a:avLst/>
+          </a:prstGeom>
+          <a:noFill/>
+        </p:spPr>
+        <p:txBody>
+          <a:bodyPr wrap="square">
+            <a:spAutoFit/>
+          </a:bodyPr>
+          <a:lstStyle/>
+          <a:p>
+            <a:pPr lvl="0" indent="0">
+              <a:buNone/>
+            </a:pPr>
+            <a:r>
+              <a:rPr lang="en-US" dirty="0">
+                <a:latin typeface="Courier"/>
+              </a:rPr>
+              <a:t>##        'Positive' Class : 0               
+## </a:t>
+            </a:r>
+          </a:p>
+          <a:p>
+            <a:pPr lvl="0" indent="0">
+              <a:buNone/>
+            </a:pPr>
+            <a:r>
+              <a:rPr lang="en-US" dirty="0">
+                <a:latin typeface="Courier"/>
+              </a:rPr>
+              <a:t>##    knn.24
+##      0  1
+##   0 71  8
+##   1 46 18</a:t>
+            </a:r>
+          </a:p>
+          <a:p>
+            <a:pPr lvl="0" indent="0">
+              <a:buNone/>
+            </a:pPr>
+            <a:r>
+              <a:rPr lang="en-US" dirty="0">
+                <a:latin typeface="Courier"/>
+              </a:rPr>
+              <a:t>## Confusion Matrix and Statistics
+## 
+##    knn.24
+##      0  1
+##   0 71  8
+##   1 46 18
+##                                          
+##                Accuracy : 0.6224         
+##                  95% CI : (0.5375, 0.702)
+##     No Information Rate : 0.8182         
+##     P-Value [Acc &gt; NIR] : 1              
+##                                          
+##                   Kappa : 0.1907         
+##                                          
+##  </a:t>
+            </a:r>
+            <a:r>
+              <a:rPr lang="en-US" dirty="0" err="1">
+                <a:latin typeface="Courier"/>
+              </a:rPr>
+              <a:t>Mcnemar's</a:t>
+            </a:r>
+            <a:r>
+              <a:rPr lang="en-US" dirty="0">
+                <a:latin typeface="Courier"/>
+              </a:rPr>
+              <a:t> Test P-Value : 4.777e-07      
+##                                          
+##             Sensitivity : 0.6068         
+##             Specificity : 0.6923         
+##          Pos Pred Value : 0.8987         
+##          Neg Pred Value : 0.2812         
+##              Prevalence : 0.8182         
+</a:t>
+            </a:r>
+            <a:endParaRPr lang="en-US" dirty="0"/>
+          </a:p>
+        </p:txBody>
+      </p:sp>
+    </p:spTree>
+    <p:extLst>
+      <p:ext uri="{BB962C8B-B14F-4D97-AF65-F5344CB8AC3E}">
+        <p14:creationId xmlns:p14="http://schemas.microsoft.com/office/powerpoint/2010/main" val="2927792216"/>
+      </p:ext>
+    </p:extLst>
+  </p:cSld>
+  <p:clrMapOvr>
+    <a:masterClrMapping/>
+  </p:clrMapOvr>
+</p:sld>
+</file>
+
+<file path=ppt/slides/slide16.xml><?xml version="1.0" encoding="utf-8"?>
+<p:sld xmlns:a="http://schemas.openxmlformats.org/drawingml/2006/main" xmlns:r="http://schemas.openxmlformats.org/officeDocument/2006/relationships" xmlns:p="http://schemas.openxmlformats.org/presentationml/2006/main">
+  <p:cSld>
+    <p:spTree>
+      <p:nvGrpSpPr>
+        <p:cNvPr id="1" name=""/>
+        <p:cNvGrpSpPr/>
+        <p:nvPr/>
+      </p:nvGrpSpPr>
+      <p:grpSpPr>
+        <a:xfrm>
+          <a:off x="0" y="0"/>
+          <a:ext cx="0" cy="0"/>
+          <a:chOff x="0" y="0"/>
+          <a:chExt cx="0" cy="0"/>
+        </a:xfrm>
+      </p:grpSpPr>
+      <p:sp>
+        <p:nvSpPr>
+          <p:cNvPr id="2" name="Title 1">
+            <a:extLst>
+              <a:ext uri="{FF2B5EF4-FFF2-40B4-BE49-F238E27FC236}">
+                <a16:creationId xmlns:a16="http://schemas.microsoft.com/office/drawing/2014/main" id="{C0CC142D-A576-0282-7F20-7760E3F492A0}"/>
+              </a:ext>
+            </a:extLst>
+          </p:cNvPr>
+          <p:cNvSpPr>
+            <a:spLocks noGrp="1"/>
+          </p:cNvSpPr>
+          <p:nvPr>
+            <p:ph type="title"/>
+          </p:nvPr>
+        </p:nvSpPr>
+        <p:spPr/>
+        <p:txBody>
+          <a:bodyPr/>
+          <a:lstStyle/>
+          <a:p>
+            <a:endParaRPr lang="en-US"/>
+          </a:p>
+        </p:txBody>
+      </p:sp>
+      <p:sp>
+        <p:nvSpPr>
+          <p:cNvPr id="3" name="Content Placeholder 2">
+            <a:extLst>
+              <a:ext uri="{FF2B5EF4-FFF2-40B4-BE49-F238E27FC236}">
+                <a16:creationId xmlns:a16="http://schemas.microsoft.com/office/drawing/2014/main" id="{2F99B57B-E0AA-7B6D-860F-0D78C6DD1279}"/>
+              </a:ext>
+            </a:extLst>
+          </p:cNvPr>
+          <p:cNvSpPr>
+            <a:spLocks noGrp="1"/>
+          </p:cNvSpPr>
+          <p:nvPr>
+            <p:ph idx="1"/>
+          </p:nvPr>
+        </p:nvSpPr>
+        <p:spPr/>
+        <p:txBody>
+          <a:bodyPr>
+            <a:normAutofit fontScale="62500" lnSpcReduction="20000"/>
+          </a:bodyPr>
+          <a:lstStyle/>
+          <a:p>
+            <a:pPr lvl="0" indent="0">
+              <a:buNone/>
+            </a:pPr>
+            <a:r>
+              <a:rPr lang="en-US" dirty="0">
+                <a:latin typeface="Courier"/>
+              </a:rPr>
+              <a:t>##          Detection Rate : 0.4965         
+##    Detection Prevalence : 0.5524         
+##       Balanced Accuracy : 0.6496         
+##                                          
+##        'Positive' Class : 0              
+## </a:t>
+            </a:r>
+          </a:p>
+          <a:p>
+            <a:pPr marL="0" lvl="0" indent="0">
+              <a:buNone/>
+            </a:pPr>
+            <a:r>
+              <a:rPr lang="en-US" dirty="0"/>
+              <a:t>It’s looking bad for me to survive the Titanic sinking. It likely has to do with my age as the </a:t>
+            </a:r>
+            <a:r>
+              <a:rPr lang="en-US" dirty="0" err="1"/>
+              <a:t>Pclass</a:t>
+            </a:r>
+            <a:r>
+              <a:rPr lang="en-US" dirty="0"/>
+              <a:t> doesn’t seem to have any affect.</a:t>
+            </a:r>
+          </a:p>
+          <a:p>
+            <a:pPr marL="0" lvl="0" indent="0">
+              <a:spcBef>
+                <a:spcPts val="3000"/>
+              </a:spcBef>
+              <a:buNone/>
+            </a:pPr>
+            <a:r>
+              <a:rPr lang="en-US" b="1" dirty="0"/>
+              <a:t>Question 4 - Use your model to classify the 418 randomly selected passengers in the test set (titanic_test.csv) on </a:t>
+            </a:r>
+            <a:r>
+              <a:rPr lang="en-US" b="1" dirty="0" err="1"/>
+              <a:t>github</a:t>
+            </a:r>
+            <a:r>
+              <a:rPr lang="en-US" b="1" dirty="0"/>
+              <a:t>.</a:t>
+            </a:r>
+          </a:p>
+          <a:p>
+            <a:pPr marL="0" lvl="0" indent="0">
+              <a:buNone/>
+            </a:pPr>
+            <a:r>
+              <a:rPr lang="en-US" dirty="0"/>
+              <a:t>I believe this should be relatively straight </a:t>
+            </a:r>
+            <a:r>
+              <a:rPr lang="en-US" dirty="0" err="1"/>
+              <a:t>forward..BWHAHAHAHAHAH</a:t>
+            </a:r>
+            <a:r>
+              <a:rPr lang="en-US" dirty="0"/>
+              <a:t>!!! I’ll load in the test set and cull the NAs and run it through the model.</a:t>
+            </a:r>
+          </a:p>
+          <a:p>
+            <a:pPr marL="0" lvl="0" indent="0">
+              <a:buNone/>
+            </a:pPr>
+            <a:r>
+              <a:rPr lang="en-US" b="1" dirty="0"/>
+              <a:t>I’m stuck on this one. I’m going to create another .</a:t>
+            </a:r>
+            <a:r>
+              <a:rPr lang="en-US" b="1" dirty="0" err="1"/>
+              <a:t>Rmd</a:t>
+            </a:r>
+            <a:r>
+              <a:rPr lang="en-US" b="1" dirty="0"/>
+              <a:t> and attack Part 2</a:t>
+            </a:r>
+          </a:p>
+          <a:p>
+            <a:endParaRPr lang="en-US" dirty="0"/>
+          </a:p>
+          <a:p>
+            <a:endParaRPr lang="en-US" dirty="0"/>
+          </a:p>
+          <a:p>
+            <a:endParaRPr lang="en-US" dirty="0"/>
+          </a:p>
+          <a:p>
+            <a:endParaRPr lang="en-US" dirty="0"/>
+          </a:p>
+          <a:p>
+            <a:endParaRPr lang="en-US" dirty="0"/>
+          </a:p>
+        </p:txBody>
+      </p:sp>
+    </p:spTree>
+    <p:extLst>
+      <p:ext uri="{BB962C8B-B14F-4D97-AF65-F5344CB8AC3E}">
+        <p14:creationId xmlns:p14="http://schemas.microsoft.com/office/powerpoint/2010/main" val="933512220"/>
+      </p:ext>
+    </p:extLst>
+  </p:cSld>
+  <p:clrMapOvr>
+    <a:masterClrMapping/>
+  </p:clrMapOvr>
+</p:sld>
+</file>
+
+<file path=ppt/slides/slide2.xml><?xml version="1.0" encoding="utf-8"?>
+<p:sld xmlns:a="http://schemas.openxmlformats.org/drawingml/2006/main" xmlns:r="http://schemas.openxmlformats.org/officeDocument/2006/relationships" xmlns:p="http://schemas.openxmlformats.org/presentationml/2006/main">
+  <p:cSld>
+    <p:spTree>
+      <p:nvGrpSpPr>
+        <p:cNvPr id="1" name=""/>
+        <p:cNvGrpSpPr/>
+        <p:nvPr/>
+      </p:nvGrpSpPr>
+      <p:grpSpPr>
+        <a:xfrm>
+          <a:off x="0" y="0"/>
+          <a:ext cx="0" cy="0"/>
+          <a:chOff x="0" y="0"/>
+          <a:chExt cx="0" cy="0"/>
+        </a:xfrm>
+      </p:grpSpPr>
+      <p:sp>
+        <p:nvSpPr>
+          <p:cNvPr id="2" name="Title 1"/>
+          <p:cNvSpPr>
+            <a:spLocks noGrp="1"/>
+          </p:cNvSpPr>
+          <p:nvPr>
+            <p:ph type="title"/>
+          </p:nvPr>
+        </p:nvSpPr>
+        <p:spPr/>
+        <p:txBody>
+          <a:bodyPr>
+            <a:noAutofit/>
+          </a:bodyPr>
+          <a:lstStyle/>
+          <a:p>
+            <a:pPr marL="0" lvl="0" indent="0">
+              <a:buNone/>
+            </a:pPr>
+            <a:r>
+              <a:rPr sz="1400" dirty="0"/>
+              <a:t>For Live Session Week 6 Part 1 - </a:t>
+            </a:r>
+            <a:r>
+              <a:rPr sz="1400" b="1" dirty="0"/>
+              <a:t>Download the training set: Connect to the </a:t>
+            </a:r>
+            <a:r>
+              <a:rPr sz="1400" b="1" dirty="0" err="1"/>
+              <a:t>opendatasoft</a:t>
+            </a:r>
+            <a:r>
+              <a:rPr sz="1400" b="1" dirty="0"/>
+              <a:t> website and download the random sample of 891 Titanic Passengers. This is the training set. The data come in JSON form format and you can use this URL to access the data:</a:t>
+            </a:r>
+          </a:p>
+        </p:txBody>
+      </p:sp>
+      <p:sp>
+        <p:nvSpPr>
+          <p:cNvPr id="3" name="Content Placeholder 2"/>
+          <p:cNvSpPr>
+            <a:spLocks noGrp="1"/>
+          </p:cNvSpPr>
+          <p:nvPr>
+            <p:ph idx="1"/>
+          </p:nvPr>
+        </p:nvSpPr>
+        <p:spPr/>
+        <p:txBody>
+          <a:bodyPr/>
+          <a:lstStyle/>
+          <a:p>
+            <a:pPr marL="0" lvl="0" indent="0">
+              <a:buNone/>
+            </a:pPr>
+            <a:r>
+              <a:rPr dirty="0">
+                <a:hlinkClick r:id="rId2"/>
+              </a:rPr>
+              <a:t>https://public.opendatasoft.com/api/records/1.0/search/?dataset=titanic-passengers&amp;rows=2000&amp;facet=survived&amp;facet=pclass&amp;facet=sex&amp;facet=age&amp;facet=embarked</a:t>
+            </a:r>
+          </a:p>
+          <a:p>
+            <a:pPr marL="0" lvl="0" indent="0">
+              <a:buNone/>
+            </a:pPr>
+            <a:r>
+              <a:rPr dirty="0"/>
+              <a:t>Hint: This is not trivial. I recommend that you use the </a:t>
+            </a:r>
+            <a:r>
+              <a:rPr dirty="0" err="1"/>
+              <a:t>jsonlite</a:t>
+            </a:r>
+            <a:r>
+              <a:rPr dirty="0"/>
+              <a:t> package (</a:t>
+            </a:r>
+            <a:r>
+              <a:rPr dirty="0" err="1"/>
+              <a:t>fromJSON</a:t>
+            </a:r>
+            <a:r>
+              <a:rPr dirty="0"/>
+              <a:t>()) and </a:t>
+            </a:r>
+            <a:r>
+              <a:rPr dirty="0" err="1"/>
+              <a:t>RCurl</a:t>
+            </a:r>
+            <a:r>
+              <a:rPr dirty="0"/>
+              <a:t> package (</a:t>
+            </a:r>
+            <a:r>
+              <a:rPr dirty="0" err="1"/>
+              <a:t>getURL</a:t>
+            </a:r>
+            <a:r>
+              <a:rPr dirty="0"/>
+              <a:t>()) to access the data. (We covered this in Unit 4).</a:t>
+            </a:r>
+          </a:p>
+        </p:txBody>
+      </p:sp>
+    </p:spTree>
+  </p:cSld>
+  <p:clrMapOvr>
+    <a:masterClrMapping/>
+  </p:clrMapOvr>
+</p:sld>
+</file>
+
+<file path=ppt/slides/slide3.xml><?xml version="1.0" encoding="utf-8"?>
+<p:sld xmlns:a="http://schemas.openxmlformats.org/drawingml/2006/main" xmlns:r="http://schemas.openxmlformats.org/officeDocument/2006/relationships" xmlns:p="http://schemas.openxmlformats.org/presentationml/2006/main">
+  <p:cSld>
+    <p:spTree>
+      <p:nvGrpSpPr>
+        <p:cNvPr id="1" name=""/>
+        <p:cNvGrpSpPr/>
+        <p:nvPr/>
+      </p:nvGrpSpPr>
+      <p:grpSpPr>
+        <a:xfrm>
+          <a:off x="0" y="0"/>
+          <a:ext cx="0" cy="0"/>
+          <a:chOff x="0" y="0"/>
+          <a:chExt cx="0" cy="0"/>
+        </a:xfrm>
+      </p:grpSpPr>
+      <p:sp>
+        <p:nvSpPr>
+          <p:cNvPr id="2" name="Title 1">
+            <a:extLst>
+              <a:ext uri="{FF2B5EF4-FFF2-40B4-BE49-F238E27FC236}">
+                <a16:creationId xmlns:a16="http://schemas.microsoft.com/office/drawing/2014/main" id="{D151F920-CA42-E625-FA9C-99C4ACB96E1E}"/>
+              </a:ext>
+            </a:extLst>
+          </p:cNvPr>
+          <p:cNvSpPr>
+            <a:spLocks noGrp="1"/>
+          </p:cNvSpPr>
+          <p:nvPr>
+            <p:ph type="title"/>
+          </p:nvPr>
+        </p:nvSpPr>
+        <p:spPr/>
+        <p:txBody>
+          <a:bodyPr/>
+          <a:lstStyle/>
+          <a:p>
+            <a:endParaRPr lang="en-US"/>
+          </a:p>
+        </p:txBody>
+      </p:sp>
+      <p:sp>
+        <p:nvSpPr>
+          <p:cNvPr id="3" name="Content Placeholder 2">
+            <a:extLst>
+              <a:ext uri="{FF2B5EF4-FFF2-40B4-BE49-F238E27FC236}">
+                <a16:creationId xmlns:a16="http://schemas.microsoft.com/office/drawing/2014/main" id="{C325D618-3600-19F5-5764-0150E4A21815}"/>
+              </a:ext>
+            </a:extLst>
+          </p:cNvPr>
+          <p:cNvSpPr>
+            <a:spLocks noGrp="1"/>
+          </p:cNvSpPr>
+          <p:nvPr>
+            <p:ph idx="1"/>
+          </p:nvPr>
+        </p:nvSpPr>
+        <p:spPr/>
+        <p:txBody>
+          <a:bodyPr>
+            <a:normAutofit fontScale="40000" lnSpcReduction="20000"/>
+          </a:bodyPr>
+          <a:lstStyle/>
+          <a:p>
+            <a:pPr marL="0" lvl="0" indent="0">
+              <a:spcBef>
+                <a:spcPts val="3000"/>
+              </a:spcBef>
+              <a:buNone/>
+            </a:pPr>
+            <a:r>
+              <a:rPr lang="en-US" b="1" dirty="0"/>
+              <a:t>1. </a:t>
+            </a:r>
+            <a:r>
+              <a:rPr lang="en-US" b="1" i="1" dirty="0"/>
+              <a:t>Try your best to access the data using the URL. You may also find the data (titanic_train.csv) on </a:t>
+            </a:r>
+            <a:r>
+              <a:rPr lang="en-US" b="1" i="1" dirty="0" err="1"/>
+              <a:t>github</a:t>
+            </a:r>
+            <a:r>
+              <a:rPr lang="en-US" b="1" i="1" dirty="0"/>
+              <a:t>. We will go over this data ingestion in live session.</a:t>
+            </a:r>
+          </a:p>
+          <a:p>
+            <a:pPr lvl="0" indent="0">
+              <a:buNone/>
+            </a:pPr>
+            <a:r>
+              <a:rPr lang="en-US" dirty="0">
+                <a:latin typeface="Courier"/>
+              </a:rPr>
+              <a:t>## Warning: package '</a:t>
+            </a:r>
+            <a:r>
+              <a:rPr lang="en-US" dirty="0" err="1">
+                <a:latin typeface="Courier"/>
+              </a:rPr>
+              <a:t>jsonlite</a:t>
+            </a:r>
+            <a:r>
+              <a:rPr lang="en-US" dirty="0">
+                <a:latin typeface="Courier"/>
+              </a:rPr>
+              <a:t>' was built under R version 4.2.2</a:t>
+            </a:r>
+          </a:p>
+          <a:p>
+            <a:pPr lvl="0" indent="0">
+              <a:buNone/>
+            </a:pPr>
+            <a:r>
+              <a:rPr lang="en-US" dirty="0">
+                <a:latin typeface="Courier"/>
+              </a:rPr>
+              <a:t>## Warning: package '</a:t>
+            </a:r>
+            <a:r>
+              <a:rPr lang="en-US" dirty="0" err="1">
+                <a:latin typeface="Courier"/>
+              </a:rPr>
+              <a:t>RCurl</a:t>
+            </a:r>
+            <a:r>
+              <a:rPr lang="en-US" dirty="0">
+                <a:latin typeface="Courier"/>
+              </a:rPr>
+              <a:t>' was built under R version 4.2.2</a:t>
+            </a:r>
+          </a:p>
+          <a:p>
+            <a:pPr marL="0" lvl="0" indent="0">
+              <a:buNone/>
+            </a:pPr>
+            <a:r>
+              <a:rPr lang="en-US" dirty="0"/>
+              <a:t>When I simply copy and paste the URL into a browser, here is the response from the site:</a:t>
+            </a:r>
+          </a:p>
+          <a:p>
+            <a:pPr marL="0" lvl="0" indent="0">
+              <a:buNone/>
+            </a:pPr>
+            <a:r>
+              <a:rPr lang="en-US" dirty="0"/>
+              <a:t>“{”error”: “Unknown dataset: titanic-passengers” }”</a:t>
+            </a:r>
+          </a:p>
+          <a:p>
+            <a:pPr marL="0" lvl="0" indent="0">
+              <a:buNone/>
+            </a:pPr>
+            <a:r>
+              <a:rPr lang="en-US" dirty="0"/>
+              <a:t>Not a good sign. I wonder if the link is valid? I’ll try shorter elements of the URL to see if I can navigate to the location of the data set. I navigated to public.opendatasoft.com and attempted numerous combinations to find the data set to no avail. I’m going to load the .csv file. I notice that it is unclear which column shows survived or died. </a:t>
+            </a:r>
+            <a:r>
+              <a:rPr lang="en-US" dirty="0" err="1"/>
+              <a:t>SibSP</a:t>
+            </a:r>
+            <a:r>
+              <a:rPr lang="en-US" dirty="0"/>
+              <a:t> and Parch are binary, 1s and 0s. There are 187 </a:t>
+            </a:r>
+            <a:r>
+              <a:rPr lang="en-US" dirty="0" err="1"/>
+              <a:t>SibSP</a:t>
+            </a:r>
+            <a:r>
+              <a:rPr lang="en-US" dirty="0"/>
+              <a:t> values and 164 Parch values - those with 1s. From a brief search, there were a total of 2,208 souls aboard and 712 survivors. As there are 418 observations in our data set, a subset, this doesn’t shed any light on that question. If you total those two, it equals 351. Again, a subset of 418.</a:t>
+            </a:r>
+          </a:p>
+          <a:p>
+            <a:pPr marL="0" lvl="0" indent="0">
+              <a:buNone/>
+            </a:pPr>
+            <a:r>
+              <a:rPr lang="en-US" dirty="0"/>
+              <a:t>I was able to search for and found the data set on www.kaggle.com. It had the data set broken down by columns. Of which, the Survived column has been deleted from the “test” data set. Hmm….I think I will download the data set from Kaggle because otherwise, answering #2 will prove challenging. Here are the column names in the </a:t>
+            </a:r>
+            <a:r>
+              <a:rPr lang="en-US" dirty="0" err="1"/>
+              <a:t>kaggle</a:t>
+            </a:r>
+            <a:r>
+              <a:rPr lang="en-US" dirty="0"/>
+              <a:t> training data set:</a:t>
+            </a:r>
+          </a:p>
+          <a:p>
+            <a:pPr marL="0" lvl="0" indent="0">
+              <a:buNone/>
+            </a:pPr>
+            <a:r>
+              <a:rPr lang="en-US" dirty="0" err="1"/>
+              <a:t>PassengerId</a:t>
+            </a:r>
+            <a:r>
+              <a:rPr lang="en-US" dirty="0"/>
+              <a:t>: unique ID of the passenger </a:t>
+            </a:r>
+            <a:r>
+              <a:rPr lang="en-US" b="1" dirty="0"/>
+              <a:t>Survived: 0 = No, 1 = Yes</a:t>
+            </a:r>
+            <a:r>
+              <a:rPr lang="en-US" dirty="0"/>
+              <a:t> </a:t>
+            </a:r>
+            <a:r>
+              <a:rPr lang="en-US" dirty="0" err="1"/>
+              <a:t>Pclass</a:t>
+            </a:r>
+            <a:r>
+              <a:rPr lang="en-US" dirty="0"/>
+              <a:t>: passenger class 1 = 1st, 2 = 2nd, 3 = 3rd Name: name of the passenger Sex: passenger’s sex Age: passenger’s age </a:t>
+            </a:r>
+            <a:r>
+              <a:rPr lang="en-US" dirty="0" err="1"/>
+              <a:t>SibSp</a:t>
+            </a:r>
+            <a:r>
+              <a:rPr lang="en-US" dirty="0"/>
+              <a:t>: number of siblings or spouses on the ship Parch: number of parents or children on the ship Ticket: Ticket ID Fare: the amount paid for the ticket Cabin: cabin number Embarked: Port of embarkation (C = Cherbourg, Q = Queenstown, S = Southampton)</a:t>
+            </a:r>
+          </a:p>
+          <a:p>
+            <a:pPr marL="0" lvl="0" indent="0">
+              <a:buNone/>
+            </a:pPr>
+            <a:r>
+              <a:rPr lang="en-US" dirty="0"/>
+              <a:t>It’s only now that I notice there are two titanic data sets in the GitHub repo. Details apparently do matter. So, I will work with these two data sets.</a:t>
+            </a:r>
+          </a:p>
+          <a:p>
+            <a:pPr marL="0" lvl="0" indent="0">
+              <a:buNone/>
+            </a:pPr>
+            <a:r>
+              <a:rPr lang="en-US" dirty="0"/>
+              <a:t>Here is some code I gathered from </a:t>
+            </a:r>
+            <a:r>
+              <a:rPr lang="en-US" dirty="0" err="1"/>
+              <a:t>ChatGPT</a:t>
+            </a:r>
+            <a:r>
+              <a:rPr lang="en-US" dirty="0"/>
+              <a:t> by asking the following question: </a:t>
+            </a:r>
+            <a:r>
+              <a:rPr lang="en-US" b="1" dirty="0"/>
+              <a:t>In the widely used data set titanic-passengers, in R there are two sets. a training set with 891 rows and 12 columns that includes a column of Survived. It has a 1 or a 0. 1 = survived, 0 = died. The question is first, how to change the 1 and 0 to “Lived” or “Died” and then to use K-NN to classify those who survived and died based on “Age” and “Class.” Class has 3 choices, 1 = 1st class, 2 = 2nd, 3 = 3rd. please right this code in R</a:t>
+            </a:r>
+          </a:p>
+          <a:p>
+            <a:pPr marL="0" lvl="0" indent="0">
+              <a:buNone/>
+            </a:pPr>
+            <a:r>
+              <a:rPr lang="en-US" dirty="0"/>
+              <a:t>I’m posting the code generated by </a:t>
+            </a:r>
+            <a:r>
+              <a:rPr lang="en-US" dirty="0" err="1"/>
+              <a:t>ChatGPT</a:t>
+            </a:r>
+            <a:r>
+              <a:rPr lang="en-US" dirty="0"/>
+              <a:t> in markdown language below:</a:t>
+            </a:r>
+          </a:p>
+          <a:p>
+            <a:endParaRPr lang="en-US" dirty="0"/>
+          </a:p>
+        </p:txBody>
+      </p:sp>
+    </p:spTree>
+    <p:extLst>
+      <p:ext uri="{BB962C8B-B14F-4D97-AF65-F5344CB8AC3E}">
+        <p14:creationId xmlns:p14="http://schemas.microsoft.com/office/powerpoint/2010/main" val="158525761"/>
+      </p:ext>
+    </p:extLst>
+  </p:cSld>
+  <p:clrMapOvr>
+    <a:masterClrMapping/>
+  </p:clrMapOvr>
+</p:sld>
+</file>
+
+<file path=ppt/slides/slide4.xml><?xml version="1.0" encoding="utf-8"?>
+<p:sld xmlns:a="http://schemas.openxmlformats.org/drawingml/2006/main" xmlns:r="http://schemas.openxmlformats.org/officeDocument/2006/relationships" xmlns:p="http://schemas.openxmlformats.org/presentationml/2006/main">
+  <p:cSld>
+    <p:spTree>
+      <p:nvGrpSpPr>
+        <p:cNvPr id="1" name=""/>
+        <p:cNvGrpSpPr/>
+        <p:nvPr/>
+      </p:nvGrpSpPr>
+      <p:grpSpPr>
+        <a:xfrm>
+          <a:off x="0" y="0"/>
+          <a:ext cx="0" cy="0"/>
+          <a:chOff x="0" y="0"/>
+          <a:chExt cx="0" cy="0"/>
+        </a:xfrm>
+      </p:grpSpPr>
+      <p:sp>
+        <p:nvSpPr>
+          <p:cNvPr id="2" name="Title 1"/>
+          <p:cNvSpPr>
+            <a:spLocks noGrp="1"/>
+          </p:cNvSpPr>
+          <p:nvPr>
+            <p:ph type="title"/>
+          </p:nvPr>
+        </p:nvSpPr>
+        <p:spPr/>
+        <p:txBody>
+          <a:bodyPr/>
+          <a:lstStyle/>
+          <a:p>
+            <a:pPr marL="0" lvl="0" indent="0">
+              <a:buNone/>
+            </a:pPr>
+            <a:r>
+              <a:t>Load the Titanic dataset</a:t>
+            </a:r>
+          </a:p>
+        </p:txBody>
+      </p:sp>
+      <p:sp>
+        <p:nvSpPr>
+          <p:cNvPr id="3" name="Content Placeholder 2"/>
+          <p:cNvSpPr>
+            <a:spLocks noGrp="1"/>
+          </p:cNvSpPr>
+          <p:nvPr>
+            <p:ph idx="1"/>
+          </p:nvPr>
+        </p:nvSpPr>
+        <p:spPr/>
+        <p:txBody>
+          <a:bodyPr/>
+          <a:lstStyle/>
+          <a:p>
+            <a:pPr marL="0" lvl="0" indent="0">
+              <a:buNone/>
+            </a:pPr>
+            <a:r>
+              <a:t>data(“Titanic”)</a:t>
+            </a:r>
+          </a:p>
+        </p:txBody>
+      </p:sp>
+    </p:spTree>
+  </p:cSld>
+  <p:clrMapOvr>
+    <a:masterClrMapping/>
+  </p:clrMapOvr>
+</p:sld>
+</file>
+
+<file path=ppt/slides/slide5.xml><?xml version="1.0" encoding="utf-8"?>
+<p:sld xmlns:a="http://schemas.openxmlformats.org/drawingml/2006/main" xmlns:r="http://schemas.openxmlformats.org/officeDocument/2006/relationships" xmlns:p="http://schemas.openxmlformats.org/presentationml/2006/main">
+  <p:cSld>
+    <p:spTree>
+      <p:nvGrpSpPr>
+        <p:cNvPr id="1" name=""/>
+        <p:cNvGrpSpPr/>
+        <p:nvPr/>
+      </p:nvGrpSpPr>
+      <p:grpSpPr>
+        <a:xfrm>
+          <a:off x="0" y="0"/>
+          <a:ext cx="0" cy="0"/>
+          <a:chOff x="0" y="0"/>
+          <a:chExt cx="0" cy="0"/>
+        </a:xfrm>
+      </p:grpSpPr>
+      <p:sp>
+        <p:nvSpPr>
+          <p:cNvPr id="2" name="Title 1"/>
+          <p:cNvSpPr>
+            <a:spLocks noGrp="1"/>
+          </p:cNvSpPr>
+          <p:nvPr>
+            <p:ph type="title"/>
+          </p:nvPr>
+        </p:nvSpPr>
+        <p:spPr/>
+        <p:txBody>
+          <a:bodyPr>
+            <a:normAutofit fontScale="90000"/>
+          </a:bodyPr>
+          <a:lstStyle/>
+          <a:p>
+            <a:pPr marL="0" lvl="0" indent="0">
+              <a:buNone/>
+            </a:pPr>
+            <a:r>
+              <a:t>Create a new dataset with only the “Age” and “Class” columns</a:t>
+            </a:r>
+          </a:p>
+        </p:txBody>
+      </p:sp>
+      <p:sp>
+        <p:nvSpPr>
+          <p:cNvPr id="3" name="Content Placeholder 2"/>
+          <p:cNvSpPr>
+            <a:spLocks noGrp="1"/>
+          </p:cNvSpPr>
+          <p:nvPr>
+            <p:ph idx="1"/>
+          </p:nvPr>
+        </p:nvSpPr>
+        <p:spPr/>
+        <p:txBody>
+          <a:bodyPr/>
+          <a:lstStyle/>
+          <a:p>
+            <a:pPr marL="0" lvl="0" indent="0">
+              <a:buNone/>
+            </a:pPr>
+            <a:r>
+              <a:t>Titanic_subset = Titanic[, c(“Age”, “Class”)]</a:t>
+            </a:r>
+          </a:p>
+        </p:txBody>
+      </p:sp>
+    </p:spTree>
+  </p:cSld>
+  <p:clrMapOvr>
+    <a:masterClrMapping/>
+  </p:clrMapOvr>
+</p:sld>
+</file>
+
+<file path=ppt/slides/slide6.xml><?xml version="1.0" encoding="utf-8"?>
+<p:sld xmlns:a="http://schemas.openxmlformats.org/drawingml/2006/main" xmlns:r="http://schemas.openxmlformats.org/officeDocument/2006/relationships" xmlns:p="http://schemas.openxmlformats.org/presentationml/2006/main">
+  <p:cSld>
+    <p:spTree>
+      <p:nvGrpSpPr>
+        <p:cNvPr id="1" name=""/>
+        <p:cNvGrpSpPr/>
+        <p:nvPr/>
+      </p:nvGrpSpPr>
+      <p:grpSpPr>
+        <a:xfrm>
+          <a:off x="0" y="0"/>
+          <a:ext cx="0" cy="0"/>
+          <a:chOff x="0" y="0"/>
+          <a:chExt cx="0" cy="0"/>
+        </a:xfrm>
+      </p:grpSpPr>
+      <p:sp>
+        <p:nvSpPr>
+          <p:cNvPr id="2" name="Title 1"/>
+          <p:cNvSpPr>
+            <a:spLocks noGrp="1"/>
+          </p:cNvSpPr>
+          <p:nvPr>
+            <p:ph type="title"/>
+          </p:nvPr>
+        </p:nvSpPr>
+        <p:spPr/>
+        <p:txBody>
+          <a:bodyPr>
+            <a:normAutofit fontScale="90000"/>
+          </a:bodyPr>
+          <a:lstStyle/>
+          <a:p>
+            <a:pPr marL="0" lvl="0" indent="0">
+              <a:buNone/>
+            </a:pPr>
+            <a:r>
+              <a:t>Impute missing values in the “Age” column with the median</a:t>
+            </a:r>
+          </a:p>
+        </p:txBody>
+      </p:sp>
+      <p:sp>
+        <p:nvSpPr>
+          <p:cNvPr id="3" name="Content Placeholder 2"/>
+          <p:cNvSpPr>
+            <a:spLocks noGrp="1"/>
+          </p:cNvSpPr>
+          <p:nvPr>
+            <p:ph idx="1"/>
+          </p:nvPr>
+        </p:nvSpPr>
+        <p:spPr/>
+        <p:txBody>
+          <a:bodyPr/>
+          <a:lstStyle/>
+          <a:p>
+            <a:pPr marL="0" lvl="0" indent="0">
+              <a:buNone/>
+            </a:pPr>
+            <a:r>
+              <a:t>Titanic_subset</a:t>
+            </a:r>
+            <a14:m xmlns:a14="http://schemas.microsoft.com/office/drawing/2010/main">
+              <m:oMath xmlns:m="http://schemas.openxmlformats.org/officeDocument/2006/math">
+                <m:r>
+                  <a:rPr>
+                    <a:latin typeface="Cambria Math" panose="02040503050406030204" pitchFamily="18" charset="0"/>
+                  </a:rPr>
+                  <m:t>𝐴𝑔𝑒</m:t>
+                </m:r>
+                <m:r>
+                  <a:rPr>
+                    <a:latin typeface="Cambria Math" panose="02040503050406030204" pitchFamily="18" charset="0"/>
+                  </a:rPr>
+                  <m:t>=</m:t>
+                </m:r>
+                <m:r>
+                  <a:rPr>
+                    <a:latin typeface="Cambria Math" panose="02040503050406030204" pitchFamily="18" charset="0"/>
+                  </a:rPr>
+                  <m:t>𝑖𝑓𝑒𝑙𝑠𝑒</m:t>
+                </m:r>
+                <m:r>
+                  <a:rPr>
+                    <a:latin typeface="Cambria Math" panose="02040503050406030204" pitchFamily="18" charset="0"/>
+                  </a:rPr>
+                  <m:t>(</m:t>
+                </m:r>
+                <m:r>
+                  <a:rPr>
+                    <a:latin typeface="Cambria Math" panose="02040503050406030204" pitchFamily="18" charset="0"/>
+                  </a:rPr>
+                  <m:t>𝑖𝑠</m:t>
+                </m:r>
+                <m:r>
+                  <a:rPr>
+                    <a:latin typeface="Cambria Math" panose="02040503050406030204" pitchFamily="18" charset="0"/>
+                  </a:rPr>
+                  <m:t>.</m:t>
+                </m:r>
+                <m:r>
+                  <a:rPr>
+                    <a:latin typeface="Cambria Math" panose="02040503050406030204" pitchFamily="18" charset="0"/>
+                  </a:rPr>
+                  <m:t>𝑛𝑎</m:t>
+                </m:r>
+                <m:r>
+                  <a:rPr>
+                    <a:latin typeface="Cambria Math" panose="02040503050406030204" pitchFamily="18" charset="0"/>
+                  </a:rPr>
+                  <m:t>(</m:t>
+                </m:r>
+                <m:r>
+                  <a:rPr>
+                    <a:latin typeface="Cambria Math" panose="02040503050406030204" pitchFamily="18" charset="0"/>
+                  </a:rPr>
+                  <m:t>𝑇𝑖𝑡𝑎𝑛𝑖</m:t>
+                </m:r>
+                <m:sSub>
+                  <m:sSubPr>
+                    <m:ctrlPr>
+                      <a:rPr i="1">
+                        <a:latin typeface="Cambria Math" panose="02040503050406030204" pitchFamily="18" charset="0"/>
+                      </a:rPr>
+                    </m:ctrlPr>
+                  </m:sSubPr>
+                  <m:e>
+                    <m:r>
+                      <a:rPr>
+                        <a:latin typeface="Cambria Math" panose="02040503050406030204" pitchFamily="18" charset="0"/>
+                      </a:rPr>
+                      <m:t>𝑐</m:t>
+                    </m:r>
+                  </m:e>
+                  <m:sub>
+                    <m:r>
+                      <a:rPr>
+                        <a:latin typeface="Cambria Math" panose="02040503050406030204" pitchFamily="18" charset="0"/>
+                      </a:rPr>
+                      <m:t>𝑠</m:t>
+                    </m:r>
+                  </m:sub>
+                </m:sSub>
+                <m:r>
+                  <a:rPr>
+                    <a:latin typeface="Cambria Math" panose="02040503050406030204" pitchFamily="18" charset="0"/>
+                  </a:rPr>
+                  <m:t>𝑢𝑏𝑠𝑒𝑡</m:t>
+                </m:r>
+              </m:oMath>
+            </a14:m>
+            <a:r>
+              <a:t>Age), median(Titanic_subset</a:t>
+            </a:r>
+            <a14:m xmlns:a14="http://schemas.microsoft.com/office/drawing/2010/main">
+              <m:oMath xmlns:m="http://schemas.openxmlformats.org/officeDocument/2006/math">
+                <m:r>
+                  <a:rPr>
+                    <a:latin typeface="Cambria Math" panose="02040503050406030204" pitchFamily="18" charset="0"/>
+                  </a:rPr>
+                  <m:t>𝐴𝑔𝑒</m:t>
+                </m:r>
+                <m:r>
+                  <a:rPr>
+                    <a:latin typeface="Cambria Math" panose="02040503050406030204" pitchFamily="18" charset="0"/>
+                  </a:rPr>
+                  <m:t>,</m:t>
+                </m:r>
+                <m:r>
+                  <a:rPr>
+                    <a:latin typeface="Cambria Math" panose="02040503050406030204" pitchFamily="18" charset="0"/>
+                  </a:rPr>
+                  <m:t>𝑛𝑎</m:t>
+                </m:r>
+                <m:r>
+                  <a:rPr>
+                    <a:latin typeface="Cambria Math" panose="02040503050406030204" pitchFamily="18" charset="0"/>
+                  </a:rPr>
+                  <m:t>.</m:t>
+                </m:r>
+                <m:r>
+                  <a:rPr>
+                    <a:latin typeface="Cambria Math" panose="02040503050406030204" pitchFamily="18" charset="0"/>
+                  </a:rPr>
+                  <m:t>𝑟𝑚</m:t>
+                </m:r>
+                <m:r>
+                  <a:rPr>
+                    <a:latin typeface="Cambria Math" panose="02040503050406030204" pitchFamily="18" charset="0"/>
+                  </a:rPr>
+                  <m:t>=</m:t>
+                </m:r>
+                <m:r>
+                  <a:rPr>
+                    <a:latin typeface="Cambria Math" panose="02040503050406030204" pitchFamily="18" charset="0"/>
+                  </a:rPr>
+                  <m:t>𝑇𝑅𝑈𝐸</m:t>
+                </m:r>
+                <m:r>
+                  <a:rPr>
+                    <a:latin typeface="Cambria Math" panose="02040503050406030204" pitchFamily="18" charset="0"/>
+                  </a:rPr>
+                  <m:t>),</m:t>
+                </m:r>
+                <m:r>
+                  <a:rPr>
+                    <a:latin typeface="Cambria Math" panose="02040503050406030204" pitchFamily="18" charset="0"/>
+                  </a:rPr>
+                  <m:t>𝑇𝑖𝑡𝑎𝑛𝑖</m:t>
+                </m:r>
+                <m:sSub>
+                  <m:sSubPr>
+                    <m:ctrlPr>
+                      <a:rPr i="1">
+                        <a:latin typeface="Cambria Math" panose="02040503050406030204" pitchFamily="18" charset="0"/>
+                      </a:rPr>
+                    </m:ctrlPr>
+                  </m:sSubPr>
+                  <m:e>
+                    <m:r>
+                      <a:rPr>
+                        <a:latin typeface="Cambria Math" panose="02040503050406030204" pitchFamily="18" charset="0"/>
+                      </a:rPr>
+                      <m:t>𝑐</m:t>
+                    </m:r>
+                  </m:e>
+                  <m:sub>
+                    <m:r>
+                      <a:rPr>
+                        <a:latin typeface="Cambria Math" panose="02040503050406030204" pitchFamily="18" charset="0"/>
+                      </a:rPr>
+                      <m:t>𝑠</m:t>
+                    </m:r>
+                  </m:sub>
+                </m:sSub>
+                <m:r>
+                  <a:rPr>
+                    <a:latin typeface="Cambria Math" panose="02040503050406030204" pitchFamily="18" charset="0"/>
+                  </a:rPr>
+                  <m:t>𝑢𝑏𝑠𝑒𝑡</m:t>
+                </m:r>
+              </m:oMath>
+            </a14:m>
+            <a:r>
+              <a:t>Age)</a:t>
+            </a:r>
+          </a:p>
+        </p:txBody>
+      </p:sp>
+    </p:spTree>
+  </p:cSld>
+  <p:clrMapOvr>
+    <a:masterClrMapping/>
+  </p:clrMapOvr>
+</p:sld>
+</file>
+
+<file path=ppt/slides/slide7.xml><?xml version="1.0" encoding="utf-8"?>
+<p:sld xmlns:a="http://schemas.openxmlformats.org/drawingml/2006/main" xmlns:r="http://schemas.openxmlformats.org/officeDocument/2006/relationships" xmlns:p="http://schemas.openxmlformats.org/presentationml/2006/main">
+  <p:cSld>
+    <p:spTree>
+      <p:nvGrpSpPr>
+        <p:cNvPr id="1" name=""/>
+        <p:cNvGrpSpPr/>
+        <p:nvPr/>
+      </p:nvGrpSpPr>
+      <p:grpSpPr>
+        <a:xfrm>
+          <a:off x="0" y="0"/>
+          <a:ext cx="0" cy="0"/>
+          <a:chOff x="0" y="0"/>
+          <a:chExt cx="0" cy="0"/>
+        </a:xfrm>
+      </p:grpSpPr>
+      <p:sp>
+        <p:nvSpPr>
+          <p:cNvPr id="2" name="Title 1"/>
+          <p:cNvSpPr>
+            <a:spLocks noGrp="1"/>
+          </p:cNvSpPr>
+          <p:nvPr>
+            <p:ph type="title"/>
+          </p:nvPr>
+        </p:nvSpPr>
+        <p:spPr/>
+        <p:txBody>
+          <a:bodyPr/>
+          <a:lstStyle/>
+          <a:p>
+            <a:pPr marL="0" lvl="0" indent="0">
+              <a:buNone/>
+            </a:pPr>
+            <a:r>
+              <a:t>Split the data into a training set and a test set</a:t>
+            </a:r>
+          </a:p>
+        </p:txBody>
+      </p:sp>
+      <p:sp>
+        <p:nvSpPr>
+          <p:cNvPr id="3" name="Content Placeholder 2"/>
+          <p:cNvSpPr>
+            <a:spLocks noGrp="1"/>
+          </p:cNvSpPr>
+          <p:nvPr>
+            <p:ph idx="1"/>
+          </p:nvPr>
+        </p:nvSpPr>
+        <p:spPr/>
+        <p:txBody>
+          <a:bodyPr/>
+          <a:lstStyle/>
+          <a:p>
+            <a:pPr marL="0" lvl="0" indent="0">
+              <a:buNone/>
+            </a:pPr>
+            <a:r>
+              <a:t>set.seed(123) train_index = sample(1:nrow(Titanic_subset), floor(0.8 * nrow(Titanic_subset))) train = Titanic_subset[train_index, ] test = Titanic_subset[-train_index, ]</a:t>
+            </a:r>
+          </a:p>
+        </p:txBody>
+      </p:sp>
+    </p:spTree>
+  </p:cSld>
+  <p:clrMapOvr>
+    <a:masterClrMapping/>
+  </p:clrMapOvr>
+</p:sld>
+</file>
+
+<file path=ppt/slides/slide8.xml><?xml version="1.0" encoding="utf-8"?>
+<p:sld xmlns:a="http://schemas.openxmlformats.org/drawingml/2006/main" xmlns:r="http://schemas.openxmlformats.org/officeDocument/2006/relationships" xmlns:p="http://schemas.openxmlformats.org/presentationml/2006/main">
+  <p:cSld>
+    <p:spTree>
+      <p:nvGrpSpPr>
+        <p:cNvPr id="1" name=""/>
+        <p:cNvGrpSpPr/>
+        <p:nvPr/>
+      </p:nvGrpSpPr>
+      <p:grpSpPr>
+        <a:xfrm>
+          <a:off x="0" y="0"/>
+          <a:ext cx="0" cy="0"/>
+          <a:chOff x="0" y="0"/>
+          <a:chExt cx="0" cy="0"/>
+        </a:xfrm>
+      </p:grpSpPr>
+      <p:sp>
+        <p:nvSpPr>
+          <p:cNvPr id="2" name="Title 1"/>
+          <p:cNvSpPr>
+            <a:spLocks noGrp="1"/>
+          </p:cNvSpPr>
+          <p:nvPr>
+            <p:ph type="title"/>
+          </p:nvPr>
+        </p:nvSpPr>
+        <p:spPr/>
+        <p:txBody>
+          <a:bodyPr/>
+          <a:lstStyle/>
+          <a:p>
+            <a:pPr marL="0" lvl="0" indent="0">
+              <a:buNone/>
+            </a:pPr>
+            <a:r>
+              <a:t>Fit a K-NN model on the training set</a:t>
+            </a:r>
+          </a:p>
+        </p:txBody>
+      </p:sp>
+      <p:sp>
+        <p:nvSpPr>
+          <p:cNvPr id="3" name="Content Placeholder 2"/>
+          <p:cNvSpPr>
+            <a:spLocks noGrp="1"/>
+          </p:cNvSpPr>
+          <p:nvPr>
+            <p:ph idx="1"/>
+          </p:nvPr>
+        </p:nvSpPr>
+        <p:spPr/>
+        <p:txBody>
+          <a:bodyPr/>
+          <a:lstStyle/>
+          <a:p>
+            <a:pPr marL="0" lvl="0" indent="0">
+              <a:buNone/>
+            </a:pPr>
+            <a:r>
+              <a:t>library(class) knn_model = knn(train[, -2], test[, -2], train[, 2], k = 3)</a:t>
+            </a:r>
+          </a:p>
+        </p:txBody>
+      </p:sp>
+    </p:spTree>
+  </p:cSld>
+  <p:clrMapOvr>
+    <a:masterClrMapping/>
+  </p:clrMapOvr>
+</p:sld>
+</file>
+
+<file path=ppt/slides/slide9.xml><?xml version="1.0" encoding="utf-8"?>
+<p:sld xmlns:a="http://schemas.openxmlformats.org/drawingml/2006/main" xmlns:r="http://schemas.openxmlformats.org/officeDocument/2006/relationships" xmlns:p="http://schemas.openxmlformats.org/presentationml/2006/main">
+  <p:cSld>
+    <p:spTree>
+      <p:nvGrpSpPr>
+        <p:cNvPr id="1" name=""/>
+        <p:cNvGrpSpPr/>
+        <p:nvPr/>
+      </p:nvGrpSpPr>
+      <p:grpSpPr>
+        <a:xfrm>
+          <a:off x="0" y="0"/>
+          <a:ext cx="0" cy="0"/>
+          <a:chOff x="0" y="0"/>
+          <a:chExt cx="0" cy="0"/>
+        </a:xfrm>
+      </p:grpSpPr>
+      <p:sp>
+        <p:nvSpPr>
+          <p:cNvPr id="2" name="Title 1"/>
+          <p:cNvSpPr>
+            <a:spLocks noGrp="1"/>
+          </p:cNvSpPr>
+          <p:nvPr>
+            <p:ph type="title"/>
+          </p:nvPr>
+        </p:nvSpPr>
+        <p:spPr/>
+        <p:txBody>
+          <a:bodyPr>
+            <a:normAutofit fontScale="90000"/>
+          </a:bodyPr>
+          <a:lstStyle/>
+          <a:p>
+            <a:pPr marL="0" lvl="0" indent="0">
+              <a:buNone/>
+            </a:pPr>
+            <a:r>
+              <a:t>Predict the survival of passengers in the test set</a:t>
+            </a:r>
+          </a:p>
+        </p:txBody>
+      </p:sp>
+      <p:sp>
+        <p:nvSpPr>
+          <p:cNvPr id="3" name="Content Placeholder 2"/>
+          <p:cNvSpPr>
+            <a:spLocks noGrp="1"/>
+          </p:cNvSpPr>
+          <p:nvPr>
+            <p:ph idx="1"/>
+          </p:nvPr>
+        </p:nvSpPr>
+        <p:spPr/>
+        <p:txBody>
+          <a:bodyPr/>
+          <a:lstStyle/>
+          <a:p>
+            <a:pPr marL="0" lvl="0" indent="0">
+              <a:buNone/>
+            </a:pPr>
+            <a:r>
+              <a:t>pred = knn_model</a:t>
+            </a:r>
+          </a:p>
+        </p:txBody>
+      </p:sp>
+    </p:spTree>
+  </p:cSld>
+  <p:clrMapOvr>
+    <a:masterClrMapping/>
+  </p:clrMapOvr>
 </p:sld>
 </file>
 
@@ -3500,265 +5900,4 @@
   </a:objectDefaults>
   <a:extraClrSchemeLst/>
 </a:theme>
-</file>
-
-<file path=ppt/theme/theme2.xml><?xml version="1.0" encoding="utf-8"?>
-<a:theme xmlns:a="http://schemas.openxmlformats.org/drawingml/2006/main" name="Office Theme">
-  <a:themeElements>
-    <a:clrScheme name="Office">
-      <a:dk1>
-        <a:sysClr val="windowText" lastClr="000000"/>
-      </a:dk1>
-      <a:lt1>
-        <a:sysClr val="window" lastClr="FFFFFF"/>
-      </a:lt1>
-      <a:dk2>
-        <a:srgbClr val="44546A"/>
-      </a:dk2>
-      <a:lt2>
-        <a:srgbClr val="E7E6E6"/>
-      </a:lt2>
-      <a:accent1>
-        <a:srgbClr val="5B9BD5"/>
-      </a:accent1>
-      <a:accent2>
-        <a:srgbClr val="ED7D31"/>
-      </a:accent2>
-      <a:accent3>
-        <a:srgbClr val="A5A5A5"/>
-      </a:accent3>
-      <a:accent4>
-        <a:srgbClr val="FFC000"/>
-      </a:accent4>
-      <a:accent5>
-        <a:srgbClr val="4472C4"/>
-      </a:accent5>
-      <a:accent6>
-        <a:srgbClr val="70AD47"/>
-      </a:accent6>
-      <a:hlink>
-        <a:srgbClr val="0563C1"/>
-      </a:hlink>
-      <a:folHlink>
-        <a:srgbClr val="954F72"/>
-      </a:folHlink>
-    </a:clrScheme>
-    <a:fontScheme name="Office">
-      <a:majorFont>
-        <a:latin typeface="Calibri Light" panose="020F0302020204030204"/>
-        <a:ea typeface=""/>
-        <a:cs typeface=""/>
-        <a:font script="Jpan" typeface="ＭＳ Ｐゴシック"/>
-        <a:font script="Hang" typeface="맑은 고딕"/>
-        <a:font script="Hans" typeface="宋体"/>
-        <a:font script="Hant" typeface="新細明體"/>
-        <a:font script="Arab" typeface="Times New Roman"/>
-        <a:font script="Hebr" typeface="Times New Roman"/>
-        <a:font script="Thai" typeface="Angsana New"/>
-        <a:font script="Ethi" typeface="Nyala"/>
-        <a:font script="Beng" typeface="Vrinda"/>
-        <a:font script="Gujr" typeface="Shruti"/>
-        <a:font script="Khmr" typeface="MoolBoran"/>
-        <a:font script="Knda" typeface="Tunga"/>
-        <a:font script="Guru" typeface="Raavi"/>
-        <a:font script="Cans" typeface="Euphemia"/>
-        <a:font script="Cher" typeface="Plantagenet Cherokee"/>
-        <a:font script="Yiii" typeface="Microsoft Yi Baiti"/>
-        <a:font script="Tibt" typeface="Microsoft Himalaya"/>
-        <a:font script="Thaa" typeface="MV Boli"/>
-        <a:font script="Deva" typeface="Mangal"/>
-        <a:font script="Telu" typeface="Gautami"/>
-        <a:font script="Taml" typeface="Latha"/>
-        <a:font script="Syrc" typeface="Estrangelo Edessa"/>
-        <a:font script="Orya" typeface="Kalinga"/>
-        <a:font script="Mlym" typeface="Kartika"/>
-        <a:font script="Laoo" typeface="DokChampa"/>
-        <a:font script="Sinh" typeface="Iskoola Pota"/>
-        <a:font script="Mong" typeface="Mongolian Baiti"/>
-        <a:font script="Viet" typeface="Times New Roman"/>
-        <a:font script="Uigh" typeface="Microsoft Uighur"/>
-        <a:font script="Geor" typeface="Sylfaen"/>
-      </a:majorFont>
-      <a:minorFont>
-        <a:latin typeface="Calibri" panose="020F0502020204030204"/>
-        <a:ea typeface=""/>
-        <a:cs typeface=""/>
-        <a:font script="Jpan" typeface="ＭＳ Ｐゴシック"/>
-        <a:font script="Hang" typeface="맑은 고딕"/>
-        <a:font script="Hans" typeface="宋体"/>
-        <a:font script="Hant" typeface="新細明體"/>
-        <a:font script="Arab" typeface="Arial"/>
-        <a:font script="Hebr" typeface="Arial"/>
-        <a:font script="Thai" typeface="Cordia New"/>
-        <a:font script="Ethi" typeface="Nyala"/>
-        <a:font script="Beng" typeface="Vrinda"/>
-        <a:font script="Gujr" typeface="Shruti"/>
-        <a:font script="Khmr" typeface="DaunPenh"/>
-        <a:font script="Knda" typeface="Tunga"/>
-        <a:font script="Guru" typeface="Raavi"/>
-        <a:font script="Cans" typeface="Euphemia"/>
-        <a:font script="Cher" typeface="Plantagenet Cherokee"/>
-        <a:font script="Yiii" typeface="Microsoft Yi Baiti"/>
-        <a:font script="Tibt" typeface="Microsoft Himalaya"/>
-        <a:font script="Thaa" typeface="MV Boli"/>
-        <a:font script="Deva" typeface="Mangal"/>
-        <a:font script="Telu" typeface="Gautami"/>
-        <a:font script="Taml" typeface="Latha"/>
-        <a:font script="Syrc" typeface="Estrangelo Edessa"/>
-        <a:font script="Orya" typeface="Kalinga"/>
-        <a:font script="Mlym" typeface="Kartika"/>
-        <a:font script="Laoo" typeface="DokChampa"/>
-        <a:font script="Sinh" typeface="Iskoola Pota"/>
-        <a:font script="Mong" typeface="Mongolian Baiti"/>
-        <a:font script="Viet" typeface="Arial"/>
-        <a:font script="Uigh" typeface="Microsoft Uighur"/>
-        <a:font script="Geor" typeface="Sylfaen"/>
-      </a:minorFont>
-    </a:fontScheme>
-    <a:fmtScheme name="Office">
-      <a:fillStyleLst>
-        <a:solidFill>
-          <a:schemeClr val="phClr"/>
-        </a:solidFill>
-        <a:gradFill rotWithShape="1">
-          <a:gsLst>
-            <a:gs pos="0">
-              <a:schemeClr val="phClr">
-                <a:lumMod val="110000"/>
-                <a:satMod val="105000"/>
-                <a:tint val="67000"/>
-              </a:schemeClr>
-            </a:gs>
-            <a:gs pos="50000">
-              <a:schemeClr val="phClr">
-                <a:lumMod val="105000"/>
-                <a:satMod val="103000"/>
-                <a:tint val="73000"/>
-              </a:schemeClr>
-            </a:gs>
-            <a:gs pos="100000">
-              <a:schemeClr val="phClr">
-                <a:lumMod val="105000"/>
-                <a:satMod val="109000"/>
-                <a:tint val="81000"/>
-              </a:schemeClr>
-            </a:gs>
-          </a:gsLst>
-          <a:lin ang="5400000" scaled="0"/>
-        </a:gradFill>
-        <a:gradFill rotWithShape="1">
-          <a:gsLst>
-            <a:gs pos="0">
-              <a:schemeClr val="phClr">
-                <a:satMod val="103000"/>
-                <a:lumMod val="102000"/>
-                <a:tint val="94000"/>
-              </a:schemeClr>
-            </a:gs>
-            <a:gs pos="50000">
-              <a:schemeClr val="phClr">
-                <a:satMod val="110000"/>
-                <a:lumMod val="100000"/>
-                <a:shade val="100000"/>
-              </a:schemeClr>
-            </a:gs>
-            <a:gs pos="100000">
-              <a:schemeClr val="phClr">
-                <a:lumMod val="99000"/>
-                <a:satMod val="120000"/>
-                <a:shade val="78000"/>
-              </a:schemeClr>
-            </a:gs>
-          </a:gsLst>
-          <a:lin ang="5400000" scaled="0"/>
-        </a:gradFill>
-      </a:fillStyleLst>
-      <a:lnStyleLst>
-        <a:ln w="6350" cap="flat" cmpd="sng" algn="ctr">
-          <a:solidFill>
-            <a:schemeClr val="phClr"/>
-          </a:solidFill>
-          <a:prstDash val="solid"/>
-          <a:miter lim="800000"/>
-        </a:ln>
-        <a:ln w="12700" cap="flat" cmpd="sng" algn="ctr">
-          <a:solidFill>
-            <a:schemeClr val="phClr"/>
-          </a:solidFill>
-          <a:prstDash val="solid"/>
-          <a:miter lim="800000"/>
-        </a:ln>
-        <a:ln w="19050" cap="flat" cmpd="sng" algn="ctr">
-          <a:solidFill>
-            <a:schemeClr val="phClr"/>
-          </a:solidFill>
-          <a:prstDash val="solid"/>
-          <a:miter lim="800000"/>
-        </a:ln>
-      </a:lnStyleLst>
-      <a:effectStyleLst>
-        <a:effectStyle>
-          <a:effectLst/>
-        </a:effectStyle>
-        <a:effectStyle>
-          <a:effectLst/>
-        </a:effectStyle>
-        <a:effectStyle>
-          <a:effectLst>
-            <a:outerShdw blurRad="57150" dist="19050" dir="5400000" algn="ctr" rotWithShape="0">
-              <a:srgbClr val="000000">
-                <a:alpha val="63000"/>
-              </a:srgbClr>
-            </a:outerShdw>
-          </a:effectLst>
-        </a:effectStyle>
-      </a:effectStyleLst>
-      <a:bgFillStyleLst>
-        <a:solidFill>
-          <a:schemeClr val="phClr"/>
-        </a:solidFill>
-        <a:solidFill>
-          <a:schemeClr val="phClr">
-            <a:tint val="95000"/>
-            <a:satMod val="170000"/>
-          </a:schemeClr>
-        </a:solidFill>
-        <a:gradFill rotWithShape="1">
-          <a:gsLst>
-            <a:gs pos="0">
-              <a:schemeClr val="phClr">
-                <a:tint val="93000"/>
-                <a:satMod val="150000"/>
-                <a:shade val="98000"/>
-                <a:lumMod val="102000"/>
-              </a:schemeClr>
-            </a:gs>
-            <a:gs pos="50000">
-              <a:schemeClr val="phClr">
-                <a:tint val="98000"/>
-                <a:satMod val="130000"/>
-                <a:shade val="90000"/>
-                <a:lumMod val="103000"/>
-              </a:schemeClr>
-            </a:gs>
-            <a:gs pos="100000">
-              <a:schemeClr val="phClr">
-                <a:shade val="63000"/>
-                <a:satMod val="120000"/>
-              </a:schemeClr>
-            </a:gs>
-          </a:gsLst>
-          <a:lin ang="5400000" scaled="0"/>
-        </a:gradFill>
-      </a:bgFillStyleLst>
-    </a:fmtScheme>
-  </a:themeElements>
-  <a:objectDefaults/>
-  <a:extraClrSchemeLst/>
-  <a:extLst>
-    <a:ext uri="{05A4C25C-085E-4340-85A3-A5531E510DB2}">
-      <thm15:themeFamily xmlns:thm15="http://schemas.microsoft.com/office/thememl/2012/main" name="Office Theme" id="{62F939B6-93AF-4DB8-9C6B-D6C7DFDC589F}" vid="{4A3C46E8-61CC-4603-A589-7422A47A8E4A}"/>
-    </a:ext>
-  </a:extLst>
-</a:theme>
 </file>
</xml_diff>